<commit_message>
Update Proyectos de inversion Función AMBIENTE.pptx
</commit_message>
<xml_diff>
--- a/Proyectos de inversion Función AMBIENTE.pptx
+++ b/Proyectos de inversion Función AMBIENTE.pptx
@@ -112,6 +112,11 @@
       </a:defRPr>
     </a:lvl9pPr>
   </p:defaultTextStyle>
+  <p:extLst>
+    <p:ext uri="{EFAFB233-063F-42B5-8137-9DF3F51BA10A}">
+      <p15:sldGuideLst xmlns:p15="http://schemas.microsoft.com/office/powerpoint/2012/main"/>
+    </p:ext>
+  </p:extLst>
 </p:presentation>
 </file>
 
@@ -4856,14 +4861,14 @@
           <p:nvPr>
             <p:extLst>
               <p:ext uri="{D42A27DB-BD31-4B8C-83A1-F6EECF244321}">
-                <p14:modId xmlns:p14="http://schemas.microsoft.com/office/powerpoint/2010/main" val="780327327"/>
+                <p14:modId xmlns:p14="http://schemas.microsoft.com/office/powerpoint/2010/main" val="3918238977"/>
               </p:ext>
             </p:extLst>
           </p:nvPr>
         </p:nvGraphicFramePr>
         <p:xfrm>
-          <a:off x="255881" y="1884116"/>
-          <a:ext cx="10732185" cy="3962400"/>
+          <a:off x="255881" y="1198316"/>
+          <a:ext cx="11500689" cy="5303520"/>
         </p:xfrm>
         <a:graphic>
           <a:graphicData uri="http://schemas.openxmlformats.org/drawingml/2006/table">
@@ -4872,42 +4877,56 @@
                 <a:tableStyleId>{5A111915-BE36-4E01-A7E5-04B1672EAD32}</a:tableStyleId>
               </a:tblPr>
               <a:tblGrid>
-                <a:gridCol w="838133">
+                <a:gridCol w="495233">
+                  <a:extLst>
+                    <a:ext uri="{9D8B030D-6E8A-4147-A177-3AD203B41FA5}">
+                      <a16:colId xmlns:a16="http://schemas.microsoft.com/office/drawing/2014/main" val="3231368027"/>
+                    </a:ext>
+                  </a:extLst>
+                </a:gridCol>
+                <a:gridCol w="800100">
                   <a:extLst>
                     <a:ext uri="{9D8B030D-6E8A-4147-A177-3AD203B41FA5}">
                       <a16:colId xmlns:a16="http://schemas.microsoft.com/office/drawing/2014/main" val="3565300996"/>
                     </a:ext>
                   </a:extLst>
                 </a:gridCol>
-                <a:gridCol w="4756202">
+                <a:gridCol w="938893">
+                  <a:extLst>
+                    <a:ext uri="{9D8B030D-6E8A-4147-A177-3AD203B41FA5}">
+                      <a16:colId xmlns:a16="http://schemas.microsoft.com/office/drawing/2014/main" val="1968479116"/>
+                    </a:ext>
+                  </a:extLst>
+                </a:gridCol>
+                <a:gridCol w="3722914">
                   <a:extLst>
                     <a:ext uri="{9D8B030D-6E8A-4147-A177-3AD203B41FA5}">
                       <a16:colId xmlns:a16="http://schemas.microsoft.com/office/drawing/2014/main" val="1429739352"/>
                     </a:ext>
                   </a:extLst>
                 </a:gridCol>
-                <a:gridCol w="1278495">
+                <a:gridCol w="1110343">
                   <a:extLst>
                     <a:ext uri="{9D8B030D-6E8A-4147-A177-3AD203B41FA5}">
                       <a16:colId xmlns:a16="http://schemas.microsoft.com/office/drawing/2014/main" val="1073880851"/>
                     </a:ext>
                   </a:extLst>
                 </a:gridCol>
-                <a:gridCol w="1197614">
+                <a:gridCol w="1200150">
                   <a:extLst>
                     <a:ext uri="{9D8B030D-6E8A-4147-A177-3AD203B41FA5}">
                       <a16:colId xmlns:a16="http://schemas.microsoft.com/office/drawing/2014/main" val="4239792826"/>
                     </a:ext>
                   </a:extLst>
                 </a:gridCol>
-                <a:gridCol w="1565392">
+                <a:gridCol w="1967593">
                   <a:extLst>
                     <a:ext uri="{9D8B030D-6E8A-4147-A177-3AD203B41FA5}">
                       <a16:colId xmlns:a16="http://schemas.microsoft.com/office/drawing/2014/main" val="3466243991"/>
                     </a:ext>
                   </a:extLst>
                 </a:gridCol>
-                <a:gridCol w="1096349">
+                <a:gridCol w="1265463">
                   <a:extLst>
                     <a:ext uri="{9D8B030D-6E8A-4147-A177-3AD203B41FA5}">
                       <a16:colId xmlns:a16="http://schemas.microsoft.com/office/drawing/2014/main" val="1146080519"/>
@@ -4923,9 +4942,10 @@
                     <a:p>
                       <a:pPr algn="ctr"/>
                       <a:r>
-                        <a:rPr lang="es-PE" sz="1100" dirty="0"/>
-                        <a:t>CUI</a:t>
+                        <a:rPr lang="es-PE" sz="1100" dirty="0" smtClean="0"/>
+                        <a:t>N°</a:t>
                       </a:r>
+                      <a:endParaRPr lang="es-PE" sz="1100" dirty="0"/>
                     </a:p>
                   </a:txBody>
                   <a:tcPr marL="121920" marR="121920" marT="60960" marB="60960"/>
@@ -4935,29 +4955,52 @@
                     <a:bodyPr/>
                     <a:lstStyle/>
                     <a:p>
-                      <a:pPr marL="0" marR="0" lvl="0" indent="0" algn="l" defTabSz="914400" rtl="0" eaLnBrk="1" fontAlgn="auto" latinLnBrk="0" hangingPunct="1">
-                        <a:lnSpc>
-                          <a:spcPct val="100000"/>
-                        </a:lnSpc>
-                        <a:spcBef>
-                          <a:spcPts val="0"/>
-                        </a:spcBef>
-                        <a:spcAft>
-                          <a:spcPts val="0"/>
-                        </a:spcAft>
-                        <a:buClr>
-                          <a:srgbClr val="000000"/>
-                        </a:buClr>
-                        <a:buSzTx/>
-                        <a:buFont typeface="Arial"/>
-                        <a:buNone/>
-                        <a:tabLst/>
-                        <a:defRPr/>
-                      </a:pPr>
+                      <a:pPr algn="ctr"/>
                       <a:r>
-                        <a:rPr lang="es-PE" sz="1100" b="1" dirty="0"/>
-                        <a:t>Proyectos</a:t>
+                        <a:rPr lang="es-PE" sz="1100" dirty="0"/>
+                        <a:t>CUI</a:t>
                       </a:r>
+                    </a:p>
+                  </a:txBody>
+                  <a:tcPr marL="121920" marR="121920" marT="60960" marB="60960"/>
+                </a:tc>
+                <a:tc>
+                  <a:txBody>
+                    <a:bodyPr/>
+                    <a:lstStyle/>
+                    <a:p>
+                      <a:pPr algn="ctr"/>
+                      <a:r>
+                        <a:rPr lang="es-PE" sz="1100" dirty="0" smtClean="0"/>
+                        <a:t>CODIGO DE IDEA</a:t>
+                      </a:r>
+                    </a:p>
+                    <a:p>
+                      <a:pPr algn="ctr"/>
+                      <a:endParaRPr lang="es-PE" sz="1100" dirty="0"/>
+                    </a:p>
+                  </a:txBody>
+                  <a:tcPr marL="121920" marR="121920" marT="60960" marB="60960"/>
+                </a:tc>
+                <a:tc>
+                  <a:txBody>
+                    <a:bodyPr/>
+                    <a:lstStyle/>
+                    <a:p>
+                      <a:pPr algn="ctr" rtl="0" fontAlgn="ctr"/>
+                      <a:r>
+                        <a:rPr lang="es-PE" sz="1100" b="1" u="none" strike="noStrike" dirty="0" smtClean="0">
+                          <a:effectLst/>
+                        </a:rPr>
+                        <a:t>NOMBRE DEL PROYECTO DE INVERSIÓN</a:t>
+                      </a:r>
+                      <a:endParaRPr lang="es-PE" sz="1100" b="1" i="0" u="none" strike="noStrike" dirty="0">
+                        <a:solidFill>
+                          <a:srgbClr val="000000"/>
+                        </a:solidFill>
+                        <a:effectLst/>
+                        <a:latin typeface="Arial Narrow" panose="020B0606020202030204" pitchFamily="34" charset="0"/>
+                      </a:endParaRPr>
                     </a:p>
                   </a:txBody>
                   <a:tcPr marL="121920" marR="121920" marT="60960" marB="60960"/>
@@ -4988,9 +5031,8 @@
                       </a:pPr>
                       <a:r>
                         <a:rPr lang="es-PE" sz="1100" b="1" dirty="0" smtClean="0"/>
-                        <a:t>Inversión Estimada S/</a:t>
+                        <a:t>MONTO DE INVERSIÓN S/</a:t>
                       </a:r>
-                      <a:endParaRPr lang="es-PE" sz="1100" b="1" dirty="0"/>
                     </a:p>
                   </a:txBody>
                   <a:tcPr marL="121920" marR="121920" marT="60960" marB="60960"/>
@@ -5000,7 +5042,7 @@
                     <a:bodyPr/>
                     <a:lstStyle/>
                     <a:p>
-                      <a:pPr marL="0" marR="0" lvl="0" indent="0" algn="l" defTabSz="914400" rtl="0" eaLnBrk="1" fontAlgn="auto" latinLnBrk="0" hangingPunct="1">
+                      <a:pPr marL="0" marR="0" lvl="0" indent="0" algn="ctr" defTabSz="914400" rtl="0" eaLnBrk="1" fontAlgn="auto" latinLnBrk="0" hangingPunct="1">
                         <a:lnSpc>
                           <a:spcPct val="100000"/>
                         </a:lnSpc>
@@ -5020,9 +5062,33 @@
                         <a:defRPr/>
                       </a:pPr>
                       <a:r>
-                        <a:rPr lang="es-PE" sz="1100" b="1" dirty="0"/>
-                        <a:t>Estado situacional </a:t>
+                        <a:rPr lang="es-PE" sz="1100" b="1" dirty="0" smtClean="0"/>
+                        <a:t>ESTADO SITUACIONAL </a:t>
                       </a:r>
+                      <a:endParaRPr lang="es-PE" sz="1100" b="1" dirty="0"/>
+                    </a:p>
+                  </a:txBody>
+                  <a:tcPr marL="121920" marR="121920" marT="60960" marB="60960"/>
+                </a:tc>
+                <a:tc>
+                  <a:txBody>
+                    <a:bodyPr/>
+                    <a:lstStyle/>
+                    <a:p>
+                      <a:pPr algn="ctr" rtl="0" fontAlgn="ctr"/>
+                      <a:r>
+                        <a:rPr lang="es-PE" sz="1100" b="1" u="none" strike="noStrike" dirty="0" smtClean="0">
+                          <a:effectLst/>
+                        </a:rPr>
+                        <a:t>ALCANCE</a:t>
+                      </a:r>
+                      <a:endParaRPr lang="es-PE" sz="1100" b="1" i="0" u="none" strike="noStrike" dirty="0">
+                        <a:solidFill>
+                          <a:srgbClr val="000000"/>
+                        </a:solidFill>
+                        <a:effectLst/>
+                        <a:latin typeface="Arial Narrow" panose="020B0606020202030204" pitchFamily="34" charset="0"/>
+                      </a:endParaRPr>
                     </a:p>
                   </a:txBody>
                   <a:tcPr marL="121920" marR="121920" marT="60960" marB="60960"/>
@@ -5052,41 +5118,10 @@
                         <a:defRPr/>
                       </a:pPr>
                       <a:r>
-                        <a:rPr lang="es-PE" sz="1100" b="1" dirty="0"/>
-                        <a:t>Alcance</a:t>
+                        <a:rPr lang="es-PE" sz="1100" b="1" dirty="0" smtClean="0"/>
+                        <a:t>OBSERVACIONES</a:t>
                       </a:r>
-                    </a:p>
-                  </a:txBody>
-                  <a:tcPr marL="121920" marR="121920" marT="60960" marB="60960"/>
-                </a:tc>
-                <a:tc>
-                  <a:txBody>
-                    <a:bodyPr/>
-                    <a:lstStyle/>
-                    <a:p>
-                      <a:pPr marL="0" marR="0" lvl="0" indent="0" algn="l" defTabSz="914400" rtl="0" eaLnBrk="1" fontAlgn="auto" latinLnBrk="0" hangingPunct="1">
-                        <a:lnSpc>
-                          <a:spcPct val="100000"/>
-                        </a:lnSpc>
-                        <a:spcBef>
-                          <a:spcPts val="0"/>
-                        </a:spcBef>
-                        <a:spcAft>
-                          <a:spcPts val="0"/>
-                        </a:spcAft>
-                        <a:buClr>
-                          <a:srgbClr val="000000"/>
-                        </a:buClr>
-                        <a:buSzTx/>
-                        <a:buFont typeface="Arial"/>
-                        <a:buNone/>
-                        <a:tabLst/>
-                        <a:defRPr/>
-                      </a:pPr>
-                      <a:r>
-                        <a:rPr lang="es-PE" sz="1100" b="1" dirty="0"/>
-                        <a:t>Ejecución Física Proyectada</a:t>
-                      </a:r>
+                      <a:endParaRPr lang="es-PE" sz="1100" b="1" dirty="0"/>
                     </a:p>
                   </a:txBody>
                   <a:tcPr marL="121920" marR="121920" marT="60960" marB="60960"/>
@@ -5106,11 +5141,41 @@
                       <a:pPr algn="ctr"/>
                       <a:r>
                         <a:rPr lang="es-PE" sz="1100" dirty="0" smtClean="0"/>
+                        <a:t>01</a:t>
+                      </a:r>
+                      <a:endParaRPr lang="es-PE" sz="1100" dirty="0"/>
+                    </a:p>
+                  </a:txBody>
+                  <a:tcPr marL="121920" marR="121920" marT="60960" marB="60960" anchor="ctr"/>
+                </a:tc>
+                <a:tc>
+                  <a:txBody>
+                    <a:bodyPr/>
+                    <a:lstStyle/>
+                    <a:p>
+                      <a:pPr algn="ctr"/>
+                      <a:r>
+                        <a:rPr lang="es-PE" sz="1100" dirty="0" smtClean="0"/>
                         <a:t>2471507</a:t>
                       </a:r>
                     </a:p>
                     <a:p>
                       <a:pPr algn="ctr"/>
+                      <a:endParaRPr lang="es-PE" sz="1100" dirty="0"/>
+                    </a:p>
+                  </a:txBody>
+                  <a:tcPr marL="121920" marR="121920" marT="60960" marB="60960" anchor="ctr"/>
+                </a:tc>
+                <a:tc>
+                  <a:txBody>
+                    <a:bodyPr/>
+                    <a:lstStyle/>
+                    <a:p>
+                      <a:pPr algn="ctr"/>
+                      <a:r>
+                        <a:rPr lang="es-PE" sz="1100" dirty="0" smtClean="0"/>
+                        <a:t>-</a:t>
+                      </a:r>
                       <a:endParaRPr lang="es-PE" sz="1100" dirty="0"/>
                     </a:p>
                   </a:txBody>
@@ -5154,7 +5219,7 @@
                     <a:bodyPr/>
                     <a:lstStyle/>
                     <a:p>
-                      <a:pPr marL="171450" marR="0" lvl="0" indent="-171450" algn="l" defTabSz="914400" rtl="0" eaLnBrk="1" fontAlgn="auto" latinLnBrk="0" hangingPunct="1">
+                      <a:pPr marL="0" marR="0" lvl="0" indent="0" algn="ctr" defTabSz="914400" rtl="0" eaLnBrk="1" fontAlgn="auto" latinLnBrk="0" hangingPunct="1">
                         <a:lnSpc>
                           <a:spcPct val="100000"/>
                         </a:lnSpc>
@@ -5169,7 +5234,7 @@
                         </a:buClr>
                         <a:buSzTx/>
                         <a:buFont typeface="Arial" panose="020B0604020202020204" pitchFamily="34" charset="0"/>
-                        <a:buChar char="•"/>
+                        <a:buNone/>
                         <a:tabLst/>
                         <a:defRPr/>
                       </a:pPr>
@@ -5201,7 +5266,7 @@
                     <a:bodyPr/>
                     <a:lstStyle/>
                     <a:p>
-                      <a:pPr marL="0" marR="0" lvl="0" indent="0" algn="l" defTabSz="914400" rtl="0" eaLnBrk="1" fontAlgn="auto" latinLnBrk="0" hangingPunct="1">
+                      <a:pPr marL="0" marR="0" lvl="0" indent="0" algn="ctr" defTabSz="914400" rtl="0" eaLnBrk="1" fontAlgn="auto" latinLnBrk="0" hangingPunct="1">
                         <a:lnSpc>
                           <a:spcPct val="100000"/>
                         </a:lnSpc>
@@ -5248,7 +5313,7 @@
                     <a:bodyPr/>
                     <a:lstStyle/>
                     <a:p>
-                      <a:pPr marL="171450" marR="0" lvl="0" indent="-171450" algn="l" defTabSz="914400" rtl="0" eaLnBrk="1" fontAlgn="auto" latinLnBrk="0" hangingPunct="1">
+                      <a:pPr marL="171450" marR="0" lvl="0" indent="-171450" algn="ctr" defTabSz="914400" rtl="0" eaLnBrk="1" fontAlgn="auto" latinLnBrk="0" hangingPunct="1">
                         <a:lnSpc>
                           <a:spcPct val="100000"/>
                         </a:lnSpc>
@@ -5281,92 +5346,7 @@
                     <a:bodyPr/>
                     <a:lstStyle/>
                     <a:p>
-                      <a:pPr marL="0" marR="0" lvl="0" indent="0" algn="l" defTabSz="914400" rtl="0" eaLnBrk="1" fontAlgn="auto" latinLnBrk="0" hangingPunct="1">
-                        <a:lnSpc>
-                          <a:spcPct val="100000"/>
-                        </a:lnSpc>
-                        <a:spcBef>
-                          <a:spcPts val="0"/>
-                        </a:spcBef>
-                        <a:spcAft>
-                          <a:spcPts val="0"/>
-                        </a:spcAft>
-                        <a:buClr>
-                          <a:srgbClr val="000000"/>
-                        </a:buClr>
-                        <a:buSzTx/>
-                        <a:buFont typeface="Arial"/>
-                        <a:buNone/>
-                        <a:tabLst/>
-                        <a:defRPr/>
-                      </a:pPr>
-                      <a:r>
-                        <a:rPr lang="es-PE" sz="1100" b="0" kern="1200" dirty="0" smtClean="0">
-                          <a:solidFill>
-                            <a:schemeClr val="tx1">
-                              <a:lumMod val="95000"/>
-                              <a:lumOff val="5000"/>
-                            </a:schemeClr>
-                          </a:solidFill>
-                          <a:latin typeface="+mn-lt"/>
-                          <a:ea typeface="+mn-ea"/>
-                          <a:cs typeface="+mn-cs"/>
-                        </a:rPr>
-                        <a:t>Contrata o </a:t>
-                      </a:r>
-                      <a:r>
-                        <a:rPr lang="es-PE" sz="1100" b="0" kern="1200" dirty="0" smtClean="0">
-                          <a:solidFill>
-                            <a:schemeClr val="tx1">
-                              <a:lumMod val="95000"/>
-                              <a:lumOff val="5000"/>
-                            </a:schemeClr>
-                          </a:solidFill>
-                          <a:latin typeface="+mn-lt"/>
-                          <a:ea typeface="+mn-ea"/>
-                          <a:cs typeface="+mn-cs"/>
-                          <a:sym typeface="Arial"/>
-                        </a:rPr>
-                        <a:t>Adm. Directa</a:t>
-                      </a:r>
-                    </a:p>
-                    <a:p>
-                      <a:pPr marL="0" marR="0" lvl="0" indent="0" algn="l" defTabSz="914400" rtl="0" eaLnBrk="1" fontAlgn="auto" latinLnBrk="0" hangingPunct="1">
-                        <a:lnSpc>
-                          <a:spcPct val="100000"/>
-                        </a:lnSpc>
-                        <a:spcBef>
-                          <a:spcPts val="0"/>
-                        </a:spcBef>
-                        <a:spcAft>
-                          <a:spcPts val="0"/>
-                        </a:spcAft>
-                        <a:buClr>
-                          <a:srgbClr val="000000"/>
-                        </a:buClr>
-                        <a:buSzTx/>
-                        <a:buFont typeface="Arial"/>
-                        <a:buNone/>
-                        <a:tabLst/>
-                        <a:defRPr/>
-                      </a:pPr>
-                      <a:r>
-                        <a:rPr lang="es-PE" sz="1100" b="0" kern="1200" dirty="0" smtClean="0">
-                          <a:solidFill>
-                            <a:schemeClr val="tx1">
-                              <a:lumMod val="95000"/>
-                              <a:lumOff val="5000"/>
-                            </a:schemeClr>
-                          </a:solidFill>
-                          <a:latin typeface="+mn-lt"/>
-                          <a:ea typeface="+mn-ea"/>
-                          <a:cs typeface="+mn-cs"/>
-                        </a:rPr>
-                        <a:t>(Definir)</a:t>
-                      </a:r>
-                    </a:p>
-                    <a:p>
-                      <a:pPr marL="0" marR="0" lvl="0" indent="0" algn="l" defTabSz="914400" rtl="0" eaLnBrk="1" fontAlgn="auto" latinLnBrk="0" hangingPunct="1">
+                      <a:pPr marL="0" marR="0" lvl="0" indent="0" algn="ctr" defTabSz="914400" rtl="0" eaLnBrk="1" fontAlgn="auto" latinLnBrk="0" hangingPunct="1">
                         <a:lnSpc>
                           <a:spcPct val="100000"/>
                         </a:lnSpc>
@@ -5426,7 +5406,7 @@
                           <a:cs typeface="Arial"/>
                           <a:sym typeface="Arial"/>
                         </a:rPr>
-                        <a:t>2487668</a:t>
+                        <a:t>02</a:t>
                       </a:r>
                       <a:endParaRPr lang="es-PE" sz="1100" b="0" i="0" u="none" strike="noStrike" cap="none" dirty="0">
                         <a:solidFill>
@@ -5438,7 +5418,143 @@
                       </a:endParaRPr>
                     </a:p>
                   </a:txBody>
-                  <a:tcPr marL="121920" marR="121920" marT="60960" marB="60960"/>
+                  <a:tcPr marL="121920" marR="121920" marT="60960" marB="60960" anchor="ctr"/>
+                </a:tc>
+                <a:tc>
+                  <a:txBody>
+                    <a:bodyPr/>
+                    <a:lstStyle/>
+                    <a:p>
+                      <a:pPr marL="0" marR="0" indent="0" algn="ctr" defTabSz="914400" rtl="0" eaLnBrk="1" fontAlgn="auto" latinLnBrk="0" hangingPunct="1">
+                        <a:lnSpc>
+                          <a:spcPct val="100000"/>
+                        </a:lnSpc>
+                        <a:spcBef>
+                          <a:spcPts val="0"/>
+                        </a:spcBef>
+                        <a:spcAft>
+                          <a:spcPts val="0"/>
+                        </a:spcAft>
+                        <a:buClr>
+                          <a:srgbClr val="000000"/>
+                        </a:buClr>
+                        <a:buSzTx/>
+                        <a:buFont typeface="Arial"/>
+                        <a:buNone/>
+                        <a:tabLst/>
+                        <a:defRPr/>
+                      </a:pPr>
+                      <a:r>
+                        <a:rPr lang="es-PE" sz="1100" b="0" i="0" u="none" strike="noStrike" cap="none" dirty="0" smtClean="0">
+                          <a:solidFill>
+                            <a:srgbClr val="000000"/>
+                          </a:solidFill>
+                          <a:latin typeface="Arial"/>
+                          <a:cs typeface="Arial"/>
+                          <a:sym typeface="Arial"/>
+                        </a:rPr>
+                        <a:t>2487668</a:t>
+                      </a:r>
+                    </a:p>
+                    <a:p>
+                      <a:pPr marL="0" marR="0" indent="0" algn="ctr" defTabSz="914400" rtl="0" eaLnBrk="1" fontAlgn="auto" latinLnBrk="0" hangingPunct="1">
+                        <a:lnSpc>
+                          <a:spcPct val="100000"/>
+                        </a:lnSpc>
+                        <a:spcBef>
+                          <a:spcPts val="0"/>
+                        </a:spcBef>
+                        <a:spcAft>
+                          <a:spcPts val="0"/>
+                        </a:spcAft>
+                        <a:buClr>
+                          <a:srgbClr val="000000"/>
+                        </a:buClr>
+                        <a:buSzTx/>
+                        <a:buFont typeface="Arial"/>
+                        <a:buNone/>
+                        <a:tabLst/>
+                        <a:defRPr/>
+                      </a:pPr>
+                      <a:endParaRPr lang="es-PE" sz="1100" b="0" i="0" u="none" strike="noStrike" cap="none" dirty="0" smtClean="0">
+                        <a:solidFill>
+                          <a:srgbClr val="000000"/>
+                        </a:solidFill>
+                        <a:latin typeface="Arial"/>
+                        <a:cs typeface="Arial"/>
+                        <a:sym typeface="Arial"/>
+                      </a:endParaRPr>
+                    </a:p>
+                    <a:p>
+                      <a:pPr marR="0" algn="ctr" rtl="0">
+                        <a:lnSpc>
+                          <a:spcPct val="100000"/>
+                        </a:lnSpc>
+                        <a:spcBef>
+                          <a:spcPts val="0"/>
+                        </a:spcBef>
+                        <a:spcAft>
+                          <a:spcPts val="0"/>
+                        </a:spcAft>
+                        <a:buClr>
+                          <a:srgbClr val="000000"/>
+                        </a:buClr>
+                        <a:buFont typeface="Arial"/>
+                      </a:pPr>
+                      <a:endParaRPr lang="es-PE" sz="1100" b="0" i="0" u="none" strike="noStrike" cap="none" dirty="0" smtClean="0">
+                        <a:solidFill>
+                          <a:srgbClr val="000000"/>
+                        </a:solidFill>
+                        <a:latin typeface="Arial"/>
+                        <a:cs typeface="Arial"/>
+                        <a:sym typeface="Arial"/>
+                      </a:endParaRPr>
+                    </a:p>
+                  </a:txBody>
+                  <a:tcPr marL="121920" marR="121920" marT="60960" marB="60960" anchor="ctr"/>
+                </a:tc>
+                <a:tc>
+                  <a:txBody>
+                    <a:bodyPr/>
+                    <a:lstStyle/>
+                    <a:p>
+                      <a:pPr marR="0" algn="ctr" rtl="0">
+                        <a:lnSpc>
+                          <a:spcPct val="100000"/>
+                        </a:lnSpc>
+                        <a:spcBef>
+                          <a:spcPts val="0"/>
+                        </a:spcBef>
+                        <a:spcAft>
+                          <a:spcPts val="0"/>
+                        </a:spcAft>
+                        <a:buClr>
+                          <a:srgbClr val="000000"/>
+                        </a:buClr>
+                        <a:buFont typeface="Arial"/>
+                      </a:pPr>
+                      <a:r>
+                        <a:rPr lang="es-PE" sz="1100" b="0" i="0" u="none" strike="noStrike" cap="none" dirty="0" smtClean="0">
+                          <a:solidFill>
+                            <a:srgbClr val="000000"/>
+                          </a:solidFill>
+                          <a:latin typeface="Arial"/>
+                          <a:cs typeface="Arial"/>
+                          <a:sym typeface="Arial"/>
+                        </a:rPr>
+                        <a:t>-</a:t>
+                      </a:r>
+                      <a:endParaRPr lang="es-PE" sz="1100" b="0" i="0" u="none" strike="noStrike" cap="none" dirty="0">
+                        <a:solidFill>
+                          <a:srgbClr val="000000"/>
+                        </a:solidFill>
+                        <a:latin typeface="Arial"/>
+                        <a:cs typeface="Arial"/>
+                        <a:sym typeface="Arial"/>
+                      </a:endParaRPr>
+                    </a:p>
+                  </a:txBody>
+                  <a:tcPr marL="121920" marR="121920" marT="60960" marB="60960" anchor="ctr"/>
                 </a:tc>
                 <a:tc>
                   <a:txBody>
@@ -5489,7 +5605,43 @@
                           </a:solidFill>
                           <a:sym typeface="Arial"/>
                         </a:rPr>
-                        <a:t>LA PROVINCIA DE GRAU Y COTABAMBAS  DE LA REGION DE APURIMAC</a:t>
+                        <a:t>LA PROVINCIA DE </a:t>
+                      </a:r>
+                      <a:r>
+                        <a:rPr lang="es-PE" sz="1100" b="0" u="none" strike="noStrike" cap="none" dirty="0" smtClean="0">
+                          <a:solidFill>
+                            <a:srgbClr val="000000"/>
+                          </a:solidFill>
+                          <a:sym typeface="Arial"/>
+                        </a:rPr>
+                        <a:t>COTABAMBAS </a:t>
+                      </a:r>
+                      <a:r>
+                        <a:rPr lang="es-PE" sz="1100" b="0" u="none" strike="noStrike" cap="none" dirty="0" smtClean="0">
+                          <a:solidFill>
+                            <a:srgbClr val="000000"/>
+                          </a:solidFill>
+                          <a:sym typeface="Arial"/>
+                        </a:rPr>
+                        <a:t>Y </a:t>
+                      </a:r>
+                      <a:r>
+                        <a:rPr lang="es-PE" sz="1100" b="0" u="none" strike="noStrike" cap="none" dirty="0" smtClean="0">
+                          <a:solidFill>
+                            <a:srgbClr val="000000"/>
+                          </a:solidFill>
+                          <a:sym typeface="Arial"/>
+                        </a:rPr>
+                        <a:t>GRAU  </a:t>
+                      </a:r>
+                      <a:r>
+                        <a:rPr lang="es-PE" sz="1100" b="0" u="none" strike="noStrike" cap="none" dirty="0" smtClean="0">
+                          <a:solidFill>
+                            <a:srgbClr val="000000"/>
+                          </a:solidFill>
+                          <a:sym typeface="Arial"/>
+                        </a:rPr>
+                        <a:t>DE LA REGION DE APURIMAC</a:t>
                       </a:r>
                       <a:endParaRPr lang="es-PE" sz="1100" b="0" i="0" u="none" strike="noStrike" cap="none" dirty="0">
                         <a:solidFill>
@@ -5508,375 +5660,9 @@
                     <a:bodyPr/>
                     <a:lstStyle/>
                     <a:p>
-                      <a:pPr marL="171450" marR="0" lvl="0" indent="-171450" algn="l" defTabSz="914400" rtl="0" eaLnBrk="1" fontAlgn="auto" latinLnBrk="0" hangingPunct="1">
-                        <a:lnSpc>
-                          <a:spcPct val="100000"/>
-                        </a:lnSpc>
-                        <a:spcBef>
-                          <a:spcPts val="0"/>
-                        </a:spcBef>
-                        <a:spcAft>
-                          <a:spcPts val="0"/>
-                        </a:spcAft>
-                        <a:buClr>
-                          <a:srgbClr val="000000"/>
-                        </a:buClr>
-                        <a:buSzTx/>
+                      <a:pPr marL="0" indent="0" algn="ctr">
                         <a:buFont typeface="Arial" panose="020B0604020202020204" pitchFamily="34" charset="0"/>
-                        <a:buChar char="•"/>
-                        <a:tabLst/>
-                        <a:defRPr/>
-                      </a:pPr>
-                      <a:r>
-                        <a:rPr lang="es-PE" sz="1100" b="1" kern="1200" dirty="0" smtClean="0">
-                          <a:solidFill>
-                            <a:schemeClr val="tx1"/>
-                          </a:solidFill>
-                          <a:latin typeface="+mn-lt"/>
-                          <a:ea typeface="+mn-ea"/>
-                          <a:cs typeface="+mn-cs"/>
-                        </a:rPr>
-                        <a:t>53,097,268.32</a:t>
-                      </a:r>
-                      <a:endParaRPr lang="es-PE" sz="1100" b="1" kern="1200" dirty="0">
-                        <a:solidFill>
-                          <a:schemeClr val="tx1"/>
-                        </a:solidFill>
-                        <a:latin typeface="+mn-lt"/>
-                        <a:ea typeface="+mn-ea"/>
-                        <a:cs typeface="+mn-cs"/>
-                        <a:sym typeface="Arial"/>
-                      </a:endParaRPr>
-                    </a:p>
-                  </a:txBody>
-                  <a:tcPr marL="121920" marR="121920" marT="60960" marB="60960" anchor="ctr"/>
-                </a:tc>
-                <a:tc>
-                  <a:txBody>
-                    <a:bodyPr/>
-                    <a:lstStyle/>
-                    <a:p>
-                      <a:pPr marL="0" marR="0" lvl="0" indent="0" algn="l" defTabSz="914400" rtl="0" eaLnBrk="1" fontAlgn="auto" latinLnBrk="0" hangingPunct="1">
-                        <a:lnSpc>
-                          <a:spcPct val="100000"/>
-                        </a:lnSpc>
-                        <a:spcBef>
-                          <a:spcPts val="0"/>
-                        </a:spcBef>
-                        <a:spcAft>
-                          <a:spcPts val="0"/>
-                        </a:spcAft>
-                        <a:buClr>
-                          <a:srgbClr val="000000"/>
-                        </a:buClr>
-                        <a:buSzTx/>
-                        <a:buFont typeface="Arial"/>
                         <a:buNone/>
-                        <a:tabLst/>
-                        <a:defRPr/>
-                      </a:pPr>
-                      <a:r>
-                        <a:rPr lang="es-PE" sz="1100" b="0" dirty="0" smtClean="0">
-                          <a:solidFill>
-                            <a:schemeClr val="tx1">
-                              <a:lumMod val="95000"/>
-                              <a:lumOff val="5000"/>
-                            </a:schemeClr>
-                          </a:solidFill>
-                        </a:rPr>
-                        <a:t>VIABLE</a:t>
-                      </a:r>
-                    </a:p>
-                    <a:p>
-                      <a:pPr marL="0" marR="0" lvl="0" indent="0" algn="l" defTabSz="914400" rtl="0" eaLnBrk="1" fontAlgn="auto" latinLnBrk="0" hangingPunct="1">
-                        <a:lnSpc>
-                          <a:spcPct val="100000"/>
-                        </a:lnSpc>
-                        <a:spcBef>
-                          <a:spcPts val="0"/>
-                        </a:spcBef>
-                        <a:spcAft>
-                          <a:spcPts val="0"/>
-                        </a:spcAft>
-                        <a:buClr>
-                          <a:srgbClr val="000000"/>
-                        </a:buClr>
-                        <a:buSzTx/>
-                        <a:buFont typeface="Arial"/>
-                        <a:buNone/>
-                        <a:tabLst/>
-                        <a:defRPr/>
-                      </a:pPr>
-                      <a:endParaRPr lang="es-PE" sz="1100" b="0" i="0" u="none" strike="noStrike" cap="none" dirty="0">
-                        <a:solidFill>
-                          <a:schemeClr val="tx1">
-                            <a:lumMod val="95000"/>
-                            <a:lumOff val="5000"/>
-                          </a:schemeClr>
-                        </a:solidFill>
-                        <a:latin typeface="Arial"/>
-                        <a:cs typeface="Arial"/>
-                        <a:sym typeface="Arial"/>
-                      </a:endParaRPr>
-                    </a:p>
-                  </a:txBody>
-                  <a:tcPr marL="121920" marR="121920" marT="60960" marB="60960" anchor="ctr"/>
-                </a:tc>
-                <a:tc>
-                  <a:txBody>
-                    <a:bodyPr/>
-                    <a:lstStyle/>
-                    <a:p>
-                      <a:pPr marL="171450" marR="0" lvl="0" indent="-171450" algn="l" defTabSz="914400" rtl="0" eaLnBrk="1" fontAlgn="auto" latinLnBrk="0" hangingPunct="1">
-                        <a:lnSpc>
-                          <a:spcPct val="100000"/>
-                        </a:lnSpc>
-                        <a:spcBef>
-                          <a:spcPts val="0"/>
-                        </a:spcBef>
-                        <a:spcAft>
-                          <a:spcPts val="0"/>
-                        </a:spcAft>
-                        <a:buClr>
-                          <a:srgbClr val="000000"/>
-                        </a:buClr>
-                        <a:buSzTx/>
-                        <a:buFont typeface="Arial" panose="020B0604020202020204" pitchFamily="34" charset="0"/>
-                        <a:buChar char="•"/>
-                        <a:tabLst/>
-                        <a:defRPr/>
-                      </a:pPr>
-                      <a:r>
-                        <a:rPr lang="es-PE" sz="1100" b="0" kern="1200" dirty="0" smtClean="0">
-                          <a:solidFill>
-                            <a:schemeClr val="tx1"/>
-                          </a:solidFill>
-                          <a:latin typeface="+mn-lt"/>
-                          <a:ea typeface="+mn-ea"/>
-                          <a:cs typeface="+mn-cs"/>
-                          <a:sym typeface="Arial"/>
-                        </a:rPr>
-                        <a:t>07 Distritos</a:t>
-                      </a:r>
-                    </a:p>
-                    <a:p>
-                      <a:pPr marL="171450" marR="0" lvl="0" indent="-171450" algn="l" defTabSz="914400" rtl="0" eaLnBrk="1" fontAlgn="auto" latinLnBrk="0" hangingPunct="1">
-                        <a:lnSpc>
-                          <a:spcPct val="100000"/>
-                        </a:lnSpc>
-                        <a:spcBef>
-                          <a:spcPts val="0"/>
-                        </a:spcBef>
-                        <a:spcAft>
-                          <a:spcPts val="0"/>
-                        </a:spcAft>
-                        <a:buClr>
-                          <a:srgbClr val="000000"/>
-                        </a:buClr>
-                        <a:buSzTx/>
-                        <a:buFont typeface="Arial" panose="020B0604020202020204" pitchFamily="34" charset="0"/>
-                        <a:buChar char="•"/>
-                        <a:tabLst/>
-                        <a:defRPr/>
-                      </a:pPr>
-                      <a:endParaRPr lang="es-PE" sz="1100" b="0" i="0" u="none" strike="noStrike" cap="none" dirty="0">
-                        <a:solidFill>
-                          <a:srgbClr val="000000"/>
-                        </a:solidFill>
-                        <a:latin typeface="Arial"/>
-                        <a:cs typeface="Arial"/>
-                        <a:sym typeface="Arial"/>
-                      </a:endParaRPr>
-                    </a:p>
-                  </a:txBody>
-                  <a:tcPr marL="121920" marR="121920" marT="60960" marB="60960" anchor="ctr"/>
-                </a:tc>
-                <a:tc>
-                  <a:txBody>
-                    <a:bodyPr/>
-                    <a:lstStyle/>
-                    <a:p>
-                      <a:pPr marL="0" marR="0" lvl="0" indent="0" algn="l" defTabSz="914400" rtl="0" eaLnBrk="1" fontAlgn="auto" latinLnBrk="0" hangingPunct="1">
-                        <a:lnSpc>
-                          <a:spcPct val="100000"/>
-                        </a:lnSpc>
-                        <a:spcBef>
-                          <a:spcPts val="0"/>
-                        </a:spcBef>
-                        <a:spcAft>
-                          <a:spcPts val="0"/>
-                        </a:spcAft>
-                        <a:buClr>
-                          <a:srgbClr val="000000"/>
-                        </a:buClr>
-                        <a:buSzTx/>
-                        <a:buFont typeface="Arial"/>
-                        <a:buNone/>
-                        <a:tabLst/>
-                        <a:defRPr/>
-                      </a:pPr>
-                      <a:r>
-                        <a:rPr lang="es-PE" sz="1100" b="0" kern="1200" dirty="0" smtClean="0">
-                          <a:solidFill>
-                            <a:schemeClr val="tx1">
-                              <a:lumMod val="95000"/>
-                              <a:lumOff val="5000"/>
-                            </a:schemeClr>
-                          </a:solidFill>
-                          <a:latin typeface="+mn-lt"/>
-                          <a:ea typeface="+mn-ea"/>
-                          <a:cs typeface="+mn-cs"/>
-                        </a:rPr>
-                        <a:t>Contrata o </a:t>
-                      </a:r>
-                      <a:r>
-                        <a:rPr lang="es-PE" sz="1100" b="0" kern="1200" dirty="0" smtClean="0">
-                          <a:solidFill>
-                            <a:schemeClr val="tx1">
-                              <a:lumMod val="95000"/>
-                              <a:lumOff val="5000"/>
-                            </a:schemeClr>
-                          </a:solidFill>
-                          <a:latin typeface="+mn-lt"/>
-                          <a:ea typeface="+mn-ea"/>
-                          <a:cs typeface="+mn-cs"/>
-                          <a:sym typeface="Arial"/>
-                        </a:rPr>
-                        <a:t>Adm. Directa</a:t>
-                      </a:r>
-                    </a:p>
-                    <a:p>
-                      <a:pPr marL="0" marR="0" lvl="0" indent="0" algn="l" defTabSz="914400" rtl="0" eaLnBrk="1" fontAlgn="auto" latinLnBrk="0" hangingPunct="1">
-                        <a:lnSpc>
-                          <a:spcPct val="100000"/>
-                        </a:lnSpc>
-                        <a:spcBef>
-                          <a:spcPts val="0"/>
-                        </a:spcBef>
-                        <a:spcAft>
-                          <a:spcPts val="0"/>
-                        </a:spcAft>
-                        <a:buClr>
-                          <a:srgbClr val="000000"/>
-                        </a:buClr>
-                        <a:buSzTx/>
-                        <a:buFont typeface="Arial"/>
-                        <a:buNone/>
-                        <a:tabLst/>
-                        <a:defRPr/>
-                      </a:pPr>
-                      <a:r>
-                        <a:rPr lang="es-PE" sz="1100" b="0" kern="1200" dirty="0" smtClean="0">
-                          <a:solidFill>
-                            <a:schemeClr val="tx1">
-                              <a:lumMod val="95000"/>
-                              <a:lumOff val="5000"/>
-                            </a:schemeClr>
-                          </a:solidFill>
-                          <a:latin typeface="+mn-lt"/>
-                          <a:ea typeface="+mn-ea"/>
-                          <a:cs typeface="+mn-cs"/>
-                        </a:rPr>
-                        <a:t>(Definir)</a:t>
-                      </a:r>
-                    </a:p>
-                    <a:p>
-                      <a:endParaRPr lang="es-PE" sz="1100" b="0" i="0" u="none" strike="noStrike" cap="none" dirty="0">
-                        <a:solidFill>
-                          <a:srgbClr val="000000"/>
-                        </a:solidFill>
-                        <a:latin typeface="+mn-lt"/>
-                        <a:cs typeface="Arial"/>
-                        <a:sym typeface="Arial"/>
-                      </a:endParaRPr>
-                    </a:p>
-                  </a:txBody>
-                  <a:tcPr marL="121920" marR="121920" marT="60960" marB="60960" anchor="ctr"/>
-                </a:tc>
-                <a:extLst>
-                  <a:ext uri="{0D108BD9-81ED-4DB2-BD59-A6C34878D82A}">
-                    <a16:rowId xmlns:a16="http://schemas.microsoft.com/office/drawing/2014/main" val="2214220417"/>
-                  </a:ext>
-                </a:extLst>
-              </a:tr>
-              <a:tr h="609600">
-                <a:tc>
-                  <a:txBody>
-                    <a:bodyPr/>
-                    <a:lstStyle/>
-                    <a:p>
-                      <a:pPr marR="0" algn="ctr" rtl="0">
-                        <a:lnSpc>
-                          <a:spcPct val="100000"/>
-                        </a:lnSpc>
-                        <a:spcBef>
-                          <a:spcPts val="0"/>
-                        </a:spcBef>
-                        <a:spcAft>
-                          <a:spcPts val="0"/>
-                        </a:spcAft>
-                        <a:buClr>
-                          <a:srgbClr val="000000"/>
-                        </a:buClr>
-                        <a:buFont typeface="Arial"/>
-                      </a:pPr>
-                      <a:r>
-                        <a:rPr lang="es-PE" sz="1100" b="0" i="0" u="none" strike="noStrike" cap="none" dirty="0" smtClean="0">
-                          <a:solidFill>
-                            <a:srgbClr val="000000"/>
-                          </a:solidFill>
-                          <a:latin typeface="Arial"/>
-                          <a:cs typeface="Arial"/>
-                          <a:sym typeface="Arial"/>
-                        </a:rPr>
-                        <a:t>2487519</a:t>
-                      </a:r>
-                      <a:endParaRPr lang="es-PE" sz="1100" b="0" i="0" u="none" strike="noStrike" cap="none" dirty="0">
-                        <a:solidFill>
-                          <a:srgbClr val="000000"/>
-                        </a:solidFill>
-                        <a:latin typeface="Arial"/>
-                        <a:cs typeface="Arial"/>
-                        <a:sym typeface="Arial"/>
-                      </a:endParaRPr>
-                    </a:p>
-                  </a:txBody>
-                  <a:tcPr marL="121920" marR="121920" marT="60960" marB="60960" anchor="ctr"/>
-                </a:tc>
-                <a:tc>
-                  <a:txBody>
-                    <a:bodyPr/>
-                    <a:lstStyle/>
-                    <a:p>
-                      <a:r>
-                        <a:rPr lang="es-PE" sz="1100" b="0" u="none" strike="noStrike" cap="none" dirty="0" smtClean="0">
-                          <a:solidFill>
-                            <a:srgbClr val="000000"/>
-                          </a:solidFill>
-                          <a:sym typeface="Arial"/>
-                        </a:rPr>
-                        <a:t>RECUPERACION DE LOS ECOSISTEMAS DE  PAJONAL DE PUNA HUMEDA,  SECA, BOFEDALES Y BOSQUE RELICTO MESOANDINO DE LAS UNIDADES HIDROGRAFICAS DEL RIOS CHALHUANCA, OCOÑA , 9 DISTRITOS DE LA PROVINCIA DE AYMARAES - LA REGION DE APURIMAC</a:t>
-                      </a:r>
-                      <a:endParaRPr lang="es-PE" sz="1100" b="0" i="0" u="none" strike="noStrike" cap="none" dirty="0">
-                        <a:solidFill>
-                          <a:srgbClr val="000000"/>
-                        </a:solidFill>
-                        <a:latin typeface="Arial"/>
-                        <a:cs typeface="Arial"/>
-                        <a:sym typeface="Arial"/>
-                      </a:endParaRPr>
-                    </a:p>
-                  </a:txBody>
-                  <a:tcPr marL="121920" marR="121920" marT="60960" marB="60960" anchor="ctr"/>
-                </a:tc>
-                <a:tc>
-                  <a:txBody>
-                    <a:bodyPr/>
-                    <a:lstStyle/>
-                    <a:p>
-                      <a:pPr marL="171450" indent="-171450">
-                        <a:buFont typeface="Arial" panose="020B0604020202020204" pitchFamily="34" charset="0"/>
-                        <a:buChar char="•"/>
                       </a:pPr>
                       <a:r>
                         <a:rPr lang="es-PE" sz="1100" b="1" kern="1200" dirty="0" smtClean="0">
@@ -5908,7 +5694,7 @@
                     <a:bodyPr/>
                     <a:lstStyle/>
                     <a:p>
-                      <a:pPr marL="0" marR="0" lvl="0" indent="0" algn="l" defTabSz="914400" rtl="0" eaLnBrk="1" fontAlgn="auto" latinLnBrk="0" hangingPunct="1">
+                      <a:pPr marL="0" marR="0" lvl="0" indent="0" algn="ctr" defTabSz="914400" rtl="0" eaLnBrk="1" fontAlgn="auto" latinLnBrk="0" hangingPunct="1">
                         <a:lnSpc>
                           <a:spcPct val="100000"/>
                         </a:lnSpc>
@@ -5936,10 +5722,29 @@
                             </a:schemeClr>
                           </a:solidFill>
                         </a:rPr>
-                        <a:t>VIABLE</a:t>
+                        <a:t>APROBACION</a:t>
                       </a:r>
                     </a:p>
                     <a:p>
+                      <a:pPr marL="0" marR="0" lvl="0" indent="0" algn="ctr" defTabSz="914400" rtl="0" eaLnBrk="1" fontAlgn="auto" latinLnBrk="0" hangingPunct="1">
+                        <a:lnSpc>
+                          <a:spcPct val="100000"/>
+                        </a:lnSpc>
+                        <a:spcBef>
+                          <a:spcPts val="0"/>
+                        </a:spcBef>
+                        <a:spcAft>
+                          <a:spcPts val="0"/>
+                        </a:spcAft>
+                        <a:buClr>
+                          <a:srgbClr val="000000"/>
+                        </a:buClr>
+                        <a:buSzTx/>
+                        <a:buFont typeface="Arial"/>
+                        <a:buNone/>
+                        <a:tabLst/>
+                        <a:defRPr/>
+                      </a:pPr>
                       <a:endParaRPr lang="es-PE" sz="1100" b="0" i="0" u="none" strike="noStrike" cap="none" dirty="0">
                         <a:solidFill>
                           <a:schemeClr val="tx1">
@@ -5960,7 +5765,407 @@
                     <a:bodyPr/>
                     <a:lstStyle/>
                     <a:p>
-                      <a:pPr marL="171450" indent="-171450">
+                      <a:pPr marL="171450" marR="0" lvl="0" indent="-171450" algn="ctr" defTabSz="914400" rtl="0" eaLnBrk="1" fontAlgn="auto" latinLnBrk="0" hangingPunct="1">
+                        <a:lnSpc>
+                          <a:spcPct val="100000"/>
+                        </a:lnSpc>
+                        <a:spcBef>
+                          <a:spcPts val="0"/>
+                        </a:spcBef>
+                        <a:spcAft>
+                          <a:spcPts val="0"/>
+                        </a:spcAft>
+                        <a:buClr>
+                          <a:srgbClr val="000000"/>
+                        </a:buClr>
+                        <a:buSzTx/>
+                        <a:buFont typeface="Arial" panose="020B0604020202020204" pitchFamily="34" charset="0"/>
+                        <a:buChar char="•"/>
+                        <a:tabLst/>
+                        <a:defRPr/>
+                      </a:pPr>
+                      <a:r>
+                        <a:rPr lang="es-PE" sz="1100" b="0" kern="1200" dirty="0" smtClean="0">
+                          <a:solidFill>
+                            <a:schemeClr val="tx1"/>
+                          </a:solidFill>
+                          <a:latin typeface="+mn-lt"/>
+                          <a:ea typeface="+mn-ea"/>
+                          <a:cs typeface="+mn-cs"/>
+                          <a:sym typeface="Arial"/>
+                        </a:rPr>
+                        <a:t>07 Distritos</a:t>
+                      </a:r>
+                    </a:p>
+                    <a:p>
+                      <a:pPr marL="171450" marR="0" lvl="0" indent="-171450" algn="ctr" defTabSz="914400" rtl="0" eaLnBrk="1" fontAlgn="auto" latinLnBrk="0" hangingPunct="1">
+                        <a:lnSpc>
+                          <a:spcPct val="100000"/>
+                        </a:lnSpc>
+                        <a:spcBef>
+                          <a:spcPts val="0"/>
+                        </a:spcBef>
+                        <a:spcAft>
+                          <a:spcPts val="0"/>
+                        </a:spcAft>
+                        <a:buClr>
+                          <a:srgbClr val="000000"/>
+                        </a:buClr>
+                        <a:buSzTx/>
+                        <a:buFont typeface="Arial" panose="020B0604020202020204" pitchFamily="34" charset="0"/>
+                        <a:buChar char="•"/>
+                        <a:tabLst/>
+                        <a:defRPr/>
+                      </a:pPr>
+                      <a:endParaRPr lang="es-PE" sz="1100" b="0" i="0" u="none" strike="noStrike" cap="none" dirty="0">
+                        <a:solidFill>
+                          <a:srgbClr val="000000"/>
+                        </a:solidFill>
+                        <a:latin typeface="Arial"/>
+                        <a:cs typeface="Arial"/>
+                        <a:sym typeface="Arial"/>
+                      </a:endParaRPr>
+                    </a:p>
+                  </a:txBody>
+                  <a:tcPr marL="121920" marR="121920" marT="60960" marB="60960" anchor="ctr"/>
+                </a:tc>
+                <a:tc>
+                  <a:txBody>
+                    <a:bodyPr/>
+                    <a:lstStyle/>
+                    <a:p>
+                      <a:pPr algn="ctr" fontAlgn="ctr"/>
+                      <a:r>
+                        <a:rPr lang="es-PE" sz="1100" u="none" strike="noStrike" dirty="0" smtClean="0">
+                          <a:effectLst/>
+                        </a:rPr>
+                        <a:t>Para su registro en el aplicativo informático del banco de proyectos y viabilización.</a:t>
+                      </a:r>
+                      <a:endParaRPr lang="es-PE" sz="1100" b="0" i="0" u="none" strike="noStrike" dirty="0" smtClean="0">
+                        <a:solidFill>
+                          <a:srgbClr val="000000"/>
+                        </a:solidFill>
+                        <a:effectLst/>
+                        <a:latin typeface="Arial Narrow" panose="020B0606020202030204" pitchFamily="34" charset="0"/>
+                      </a:endParaRPr>
+                    </a:p>
+                    <a:p>
+                      <a:pPr algn="ctr"/>
+                      <a:endParaRPr lang="es-PE" sz="1100" b="0" i="0" u="none" strike="noStrike" cap="none" dirty="0">
+                        <a:solidFill>
+                          <a:srgbClr val="000000"/>
+                        </a:solidFill>
+                        <a:latin typeface="+mn-lt"/>
+                        <a:cs typeface="Arial"/>
+                        <a:sym typeface="Arial"/>
+                      </a:endParaRPr>
+                    </a:p>
+                  </a:txBody>
+                  <a:tcPr marL="121920" marR="121920" marT="60960" marB="60960" anchor="ctr"/>
+                </a:tc>
+                <a:extLst>
+                  <a:ext uri="{0D108BD9-81ED-4DB2-BD59-A6C34878D82A}">
+                    <a16:rowId xmlns:a16="http://schemas.microsoft.com/office/drawing/2014/main" val="2214220417"/>
+                  </a:ext>
+                </a:extLst>
+              </a:tr>
+              <a:tr h="609600">
+                <a:tc>
+                  <a:txBody>
+                    <a:bodyPr/>
+                    <a:lstStyle/>
+                    <a:p>
+                      <a:pPr marR="0" algn="ctr" rtl="0">
+                        <a:lnSpc>
+                          <a:spcPct val="100000"/>
+                        </a:lnSpc>
+                        <a:spcBef>
+                          <a:spcPts val="0"/>
+                        </a:spcBef>
+                        <a:spcAft>
+                          <a:spcPts val="0"/>
+                        </a:spcAft>
+                        <a:buClr>
+                          <a:srgbClr val="000000"/>
+                        </a:buClr>
+                        <a:buFont typeface="Arial"/>
+                      </a:pPr>
+                      <a:r>
+                        <a:rPr lang="es-PE" sz="1100" b="0" i="0" u="none" strike="noStrike" cap="none" dirty="0" smtClean="0">
+                          <a:solidFill>
+                            <a:srgbClr val="000000"/>
+                          </a:solidFill>
+                          <a:latin typeface="Arial"/>
+                          <a:cs typeface="Arial"/>
+                          <a:sym typeface="Arial"/>
+                        </a:rPr>
+                        <a:t>03</a:t>
+                      </a:r>
+                      <a:endParaRPr lang="es-PE" sz="1100" b="0" i="0" u="none" strike="noStrike" cap="none" dirty="0">
+                        <a:solidFill>
+                          <a:srgbClr val="000000"/>
+                        </a:solidFill>
+                        <a:latin typeface="Arial"/>
+                        <a:cs typeface="Arial"/>
+                        <a:sym typeface="Arial"/>
+                      </a:endParaRPr>
+                    </a:p>
+                  </a:txBody>
+                  <a:tcPr marL="121920" marR="121920" marT="60960" marB="60960" anchor="ctr"/>
+                </a:tc>
+                <a:tc>
+                  <a:txBody>
+                    <a:bodyPr/>
+                    <a:lstStyle/>
+                    <a:p>
+                      <a:pPr marL="0" marR="0" indent="0" algn="ctr" defTabSz="914400" rtl="0" eaLnBrk="1" fontAlgn="auto" latinLnBrk="0" hangingPunct="1">
+                        <a:lnSpc>
+                          <a:spcPct val="100000"/>
+                        </a:lnSpc>
+                        <a:spcBef>
+                          <a:spcPts val="0"/>
+                        </a:spcBef>
+                        <a:spcAft>
+                          <a:spcPts val="0"/>
+                        </a:spcAft>
+                        <a:buClr>
+                          <a:srgbClr val="000000"/>
+                        </a:buClr>
+                        <a:buSzTx/>
+                        <a:buFont typeface="Arial"/>
+                        <a:buNone/>
+                        <a:tabLst/>
+                        <a:defRPr/>
+                      </a:pPr>
+                      <a:r>
+                        <a:rPr lang="es-PE" sz="1100" b="0" i="0" u="none" strike="noStrike" cap="none" dirty="0" smtClean="0">
+                          <a:solidFill>
+                            <a:srgbClr val="000000"/>
+                          </a:solidFill>
+                          <a:latin typeface="Arial"/>
+                          <a:cs typeface="Arial"/>
+                          <a:sym typeface="Arial"/>
+                        </a:rPr>
+                        <a:t>2487519</a:t>
+                      </a:r>
+                    </a:p>
+                    <a:p>
+                      <a:pPr marR="0" algn="ctr" rtl="0">
+                        <a:lnSpc>
+                          <a:spcPct val="100000"/>
+                        </a:lnSpc>
+                        <a:spcBef>
+                          <a:spcPts val="0"/>
+                        </a:spcBef>
+                        <a:spcAft>
+                          <a:spcPts val="0"/>
+                        </a:spcAft>
+                        <a:buClr>
+                          <a:srgbClr val="000000"/>
+                        </a:buClr>
+                        <a:buFont typeface="Arial"/>
+                      </a:pPr>
+                      <a:endParaRPr lang="es-PE" sz="1100" b="0" i="0" u="none" strike="noStrike" cap="none" dirty="0">
+                        <a:solidFill>
+                          <a:srgbClr val="000000"/>
+                        </a:solidFill>
+                        <a:latin typeface="Arial"/>
+                        <a:cs typeface="Arial"/>
+                        <a:sym typeface="Arial"/>
+                      </a:endParaRPr>
+                    </a:p>
+                  </a:txBody>
+                  <a:tcPr marL="121920" marR="121920" marT="60960" marB="60960" anchor="ctr"/>
+                </a:tc>
+                <a:tc>
+                  <a:txBody>
+                    <a:bodyPr/>
+                    <a:lstStyle/>
+                    <a:p>
+                      <a:pPr marR="0" algn="ctr" rtl="0">
+                        <a:lnSpc>
+                          <a:spcPct val="100000"/>
+                        </a:lnSpc>
+                        <a:spcBef>
+                          <a:spcPts val="0"/>
+                        </a:spcBef>
+                        <a:spcAft>
+                          <a:spcPts val="0"/>
+                        </a:spcAft>
+                        <a:buClr>
+                          <a:srgbClr val="000000"/>
+                        </a:buClr>
+                        <a:buFont typeface="Arial"/>
+                      </a:pPr>
+                      <a:r>
+                        <a:rPr lang="es-PE" sz="1100" b="0" i="0" u="none" strike="noStrike" cap="none" dirty="0" smtClean="0">
+                          <a:solidFill>
+                            <a:srgbClr val="000000"/>
+                          </a:solidFill>
+                          <a:latin typeface="Arial"/>
+                          <a:cs typeface="Arial"/>
+                          <a:sym typeface="Arial"/>
+                        </a:rPr>
+                        <a:t>-</a:t>
+                      </a:r>
+                      <a:endParaRPr lang="es-PE" sz="1100" b="0" i="0" u="none" strike="noStrike" cap="none" dirty="0">
+                        <a:solidFill>
+                          <a:srgbClr val="000000"/>
+                        </a:solidFill>
+                        <a:latin typeface="Arial"/>
+                        <a:cs typeface="Arial"/>
+                        <a:sym typeface="Arial"/>
+                      </a:endParaRPr>
+                    </a:p>
+                  </a:txBody>
+                  <a:tcPr marL="121920" marR="121920" marT="60960" marB="60960" anchor="ctr"/>
+                </a:tc>
+                <a:tc>
+                  <a:txBody>
+                    <a:bodyPr/>
+                    <a:lstStyle/>
+                    <a:p>
+                      <a:r>
+                        <a:rPr lang="es-PE" sz="1100" b="0" u="none" strike="noStrike" cap="none" dirty="0" smtClean="0">
+                          <a:solidFill>
+                            <a:srgbClr val="000000"/>
+                          </a:solidFill>
+                          <a:sym typeface="Arial"/>
+                        </a:rPr>
+                        <a:t>RECUPERACION DE LOS ECOSISTEMAS DE  PAJONAL DE PUNA HUMEDA,  SECA, BOFEDALES Y BOSQUE RELICTO MESOANDINO DE LAS UNIDADES HIDROGRAFICAS DEL RIOS CHALHUANCA, OCOÑA , 9 DISTRITOS DE LA PROVINCIA DE AYMARAES - LA REGION DE APURIMAC</a:t>
+                      </a:r>
+                      <a:endParaRPr lang="es-PE" sz="1100" b="0" i="0" u="none" strike="noStrike" cap="none" dirty="0">
+                        <a:solidFill>
+                          <a:srgbClr val="000000"/>
+                        </a:solidFill>
+                        <a:latin typeface="Arial"/>
+                        <a:cs typeface="Arial"/>
+                        <a:sym typeface="Arial"/>
+                      </a:endParaRPr>
+                    </a:p>
+                  </a:txBody>
+                  <a:tcPr marL="121920" marR="121920" marT="60960" marB="60960" anchor="ctr"/>
+                </a:tc>
+                <a:tc>
+                  <a:txBody>
+                    <a:bodyPr/>
+                    <a:lstStyle/>
+                    <a:p>
+                      <a:pPr marL="0" marR="0" lvl="0" indent="0" algn="ctr" defTabSz="914400" rtl="0" eaLnBrk="1" fontAlgn="auto" latinLnBrk="0" hangingPunct="1">
+                        <a:lnSpc>
+                          <a:spcPct val="100000"/>
+                        </a:lnSpc>
+                        <a:spcBef>
+                          <a:spcPts val="0"/>
+                        </a:spcBef>
+                        <a:spcAft>
+                          <a:spcPts val="0"/>
+                        </a:spcAft>
+                        <a:buClrTx/>
+                        <a:buSzTx/>
+                        <a:buFont typeface="Arial" panose="020B0604020202020204" pitchFamily="34" charset="0"/>
+                        <a:buNone/>
+                        <a:tabLst/>
+                        <a:defRPr/>
+                      </a:pPr>
+                      <a:r>
+                        <a:rPr lang="es-PE" sz="1100" b="1" kern="1200" dirty="0" smtClean="0">
+                          <a:solidFill>
+                            <a:schemeClr val="tx1"/>
+                          </a:solidFill>
+                          <a:latin typeface="+mn-lt"/>
+                          <a:ea typeface="+mn-ea"/>
+                          <a:cs typeface="+mn-cs"/>
+                        </a:rPr>
+                        <a:t>53,097,268.32</a:t>
+                      </a:r>
+                      <a:endParaRPr lang="es-PE" sz="1100" b="1" kern="1200" dirty="0" smtClean="0">
+                        <a:solidFill>
+                          <a:schemeClr val="tx1"/>
+                        </a:solidFill>
+                        <a:latin typeface="+mn-lt"/>
+                        <a:ea typeface="+mn-ea"/>
+                        <a:cs typeface="+mn-cs"/>
+                        <a:sym typeface="Arial"/>
+                      </a:endParaRPr>
+                    </a:p>
+                    <a:p>
+                      <a:pPr marL="0" indent="0" algn="ctr">
+                        <a:buFont typeface="Arial" panose="020B0604020202020204" pitchFamily="34" charset="0"/>
+                        <a:buNone/>
+                      </a:pPr>
+                      <a:endParaRPr lang="es-PE" sz="1100" b="1" kern="1200" dirty="0" smtClean="0">
+                        <a:solidFill>
+                          <a:schemeClr val="tx1"/>
+                        </a:solidFill>
+                        <a:latin typeface="+mn-lt"/>
+                        <a:ea typeface="+mn-ea"/>
+                        <a:cs typeface="+mn-cs"/>
+                        <a:sym typeface="Arial"/>
+                      </a:endParaRPr>
+                    </a:p>
+                  </a:txBody>
+                  <a:tcPr marL="121920" marR="121920" marT="60960" marB="60960" anchor="ctr"/>
+                </a:tc>
+                <a:tc>
+                  <a:txBody>
+                    <a:bodyPr/>
+                    <a:lstStyle/>
+                    <a:p>
+                      <a:pPr marL="0" marR="0" lvl="0" indent="0" algn="ctr" defTabSz="914400" rtl="0" eaLnBrk="1" fontAlgn="auto" latinLnBrk="0" hangingPunct="1">
+                        <a:lnSpc>
+                          <a:spcPct val="100000"/>
+                        </a:lnSpc>
+                        <a:spcBef>
+                          <a:spcPts val="0"/>
+                        </a:spcBef>
+                        <a:spcAft>
+                          <a:spcPts val="0"/>
+                        </a:spcAft>
+                        <a:buClr>
+                          <a:srgbClr val="000000"/>
+                        </a:buClr>
+                        <a:buSzTx/>
+                        <a:buFont typeface="Arial"/>
+                        <a:buNone/>
+                        <a:tabLst/>
+                        <a:defRPr/>
+                      </a:pPr>
+                      <a:r>
+                        <a:rPr lang="es-PE" sz="1100" b="0" dirty="0" smtClean="0">
+                          <a:solidFill>
+                            <a:schemeClr val="tx1">
+                              <a:lumMod val="95000"/>
+                              <a:lumOff val="5000"/>
+                            </a:schemeClr>
+                          </a:solidFill>
+                        </a:rPr>
+                        <a:t>APROBACION</a:t>
+                      </a:r>
+                    </a:p>
+                    <a:p>
+                      <a:pPr algn="ctr"/>
+                      <a:endParaRPr lang="es-PE" sz="1100" b="0" i="0" u="none" strike="noStrike" cap="none" dirty="0">
+                        <a:solidFill>
+                          <a:schemeClr val="tx1">
+                            <a:lumMod val="95000"/>
+                            <a:lumOff val="5000"/>
+                          </a:schemeClr>
+                        </a:solidFill>
+                        <a:latin typeface="Arial"/>
+                        <a:cs typeface="Arial"/>
+                        <a:sym typeface="Arial"/>
+                      </a:endParaRPr>
+                    </a:p>
+                  </a:txBody>
+                  <a:tcPr marL="121920" marR="121920" marT="60960" marB="60960" anchor="ctr"/>
+                </a:tc>
+                <a:tc>
+                  <a:txBody>
+                    <a:bodyPr/>
+                    <a:lstStyle/>
+                    <a:p>
+                      <a:pPr marL="171450" indent="-171450" algn="ctr">
                         <a:buFont typeface="Arial" panose="020B0604020202020204" pitchFamily="34" charset="0"/>
                         <a:buChar char="•"/>
                       </a:pPr>
@@ -5977,7 +6182,7 @@
                       </a:r>
                     </a:p>
                     <a:p>
-                      <a:pPr marL="171450" indent="-171450">
+                      <a:pPr marL="171450" indent="-171450" algn="ctr">
                         <a:buFont typeface="Arial" panose="020B0604020202020204" pitchFamily="34" charset="0"/>
                         <a:buChar char="•"/>
                       </a:pPr>
@@ -5998,91 +6203,23 @@
                     <a:bodyPr/>
                     <a:lstStyle/>
                     <a:p>
-                      <a:pPr marL="0" marR="0" lvl="0" indent="0" algn="l" defTabSz="914400" rtl="0" eaLnBrk="1" fontAlgn="auto" latinLnBrk="0" hangingPunct="1">
-                        <a:lnSpc>
-                          <a:spcPct val="100000"/>
-                        </a:lnSpc>
-                        <a:spcBef>
-                          <a:spcPts val="0"/>
-                        </a:spcBef>
-                        <a:spcAft>
-                          <a:spcPts val="0"/>
-                        </a:spcAft>
-                        <a:buClr>
-                          <a:srgbClr val="000000"/>
-                        </a:buClr>
-                        <a:buSzTx/>
-                        <a:buFont typeface="Arial"/>
-                        <a:buNone/>
-                        <a:tabLst/>
-                        <a:defRPr/>
-                      </a:pPr>
+                      <a:pPr algn="ctr" fontAlgn="ctr"/>
                       <a:r>
-                        <a:rPr lang="es-PE" sz="1100" b="0" kern="1200" dirty="0" smtClean="0">
-                          <a:solidFill>
-                            <a:schemeClr val="tx1">
-                              <a:lumMod val="95000"/>
-                              <a:lumOff val="5000"/>
-                            </a:schemeClr>
-                          </a:solidFill>
-                          <a:latin typeface="+mn-lt"/>
-                          <a:ea typeface="+mn-ea"/>
-                          <a:cs typeface="+mn-cs"/>
+                        <a:rPr lang="es-PE" sz="1100" u="none" strike="noStrike" dirty="0" smtClean="0">
+                          <a:effectLst/>
                         </a:rPr>
-                        <a:t>Contrata o </a:t>
+                        <a:t>Para su registro en el aplicativo informático del banco de proyectos y viabilización.</a:t>
                       </a:r>
-                      <a:r>
-                        <a:rPr lang="es-PE" sz="1100" b="0" kern="1200" dirty="0" smtClean="0">
-                          <a:solidFill>
-                            <a:schemeClr val="tx1">
-                              <a:lumMod val="95000"/>
-                              <a:lumOff val="5000"/>
-                            </a:schemeClr>
-                          </a:solidFill>
-                          <a:latin typeface="+mn-lt"/>
-                          <a:ea typeface="+mn-ea"/>
-                          <a:cs typeface="+mn-cs"/>
-                          <a:sym typeface="Arial"/>
-                        </a:rPr>
-                        <a:t>Adm. Directa</a:t>
-                      </a:r>
-                    </a:p>
-                    <a:p>
-                      <a:pPr marL="0" marR="0" lvl="0" indent="0" algn="l" defTabSz="914400" rtl="0" eaLnBrk="1" fontAlgn="auto" latinLnBrk="0" hangingPunct="1">
-                        <a:lnSpc>
-                          <a:spcPct val="100000"/>
-                        </a:lnSpc>
-                        <a:spcBef>
-                          <a:spcPts val="0"/>
-                        </a:spcBef>
-                        <a:spcAft>
-                          <a:spcPts val="0"/>
-                        </a:spcAft>
-                        <a:buClr>
-                          <a:srgbClr val="000000"/>
-                        </a:buClr>
-                        <a:buSzTx/>
-                        <a:buFont typeface="Arial"/>
-                        <a:buNone/>
-                        <a:tabLst/>
-                        <a:defRPr/>
-                      </a:pPr>
-                      <a:r>
-                        <a:rPr lang="es-PE" sz="1100" b="0" kern="1200" dirty="0" smtClean="0">
-                          <a:solidFill>
-                            <a:schemeClr val="tx1">
-                              <a:lumMod val="95000"/>
-                              <a:lumOff val="5000"/>
-                            </a:schemeClr>
-                          </a:solidFill>
-                          <a:latin typeface="+mn-lt"/>
-                          <a:ea typeface="+mn-ea"/>
-                          <a:cs typeface="+mn-cs"/>
-                        </a:rPr>
-                        <a:t>(Definir)</a:t>
-                      </a:r>
-                    </a:p>
-                    <a:p>
+                      <a:endParaRPr lang="es-PE" sz="1100" b="0" i="0" u="none" strike="noStrike" dirty="0" smtClean="0">
+                        <a:solidFill>
+                          <a:srgbClr val="000000"/>
+                        </a:solidFill>
+                        <a:effectLst/>
+                        <a:latin typeface="Arial Narrow" panose="020B0606020202030204" pitchFamily="34" charset="0"/>
+                      </a:endParaRPr>
+                    </a:p>
+                    <a:p>
+                      <a:pPr algn="ctr"/>
                       <a:endParaRPr lang="es-PE" sz="1100" b="0" i="0" u="none" strike="noStrike" cap="none" dirty="0">
                         <a:solidFill>
                           <a:srgbClr val="000000"/>
@@ -6122,6 +6259,17 @@
                         </a:buClr>
                         <a:buFont typeface="Arial"/>
                       </a:pPr>
+                      <a:r>
+                        <a:rPr lang="es-PE" sz="1100" b="0" i="0" u="none" strike="noStrike" cap="none" dirty="0" smtClean="0">
+                          <a:solidFill>
+                            <a:srgbClr val="000000"/>
+                          </a:solidFill>
+                          <a:latin typeface="Arial"/>
+                          <a:cs typeface="Arial"/>
+                          <a:sym typeface="Arial"/>
+                        </a:rPr>
+                        <a:t>04</a:t>
+                      </a:r>
                       <a:endParaRPr lang="es-PE" sz="1100" b="0" i="0" u="none" strike="noStrike" cap="none" dirty="0">
                         <a:solidFill>
                           <a:srgbClr val="000000"/>
@@ -6132,7 +6280,93 @@
                       </a:endParaRPr>
                     </a:p>
                   </a:txBody>
-                  <a:tcPr marL="121920" marR="121920" marT="60960" marB="60960"/>
+                  <a:tcPr marL="121920" marR="121920" marT="60960" marB="60960" anchor="ctr"/>
+                </a:tc>
+                <a:tc>
+                  <a:txBody>
+                    <a:bodyPr/>
+                    <a:lstStyle/>
+                    <a:p>
+                      <a:pPr marR="0" algn="ctr" rtl="0">
+                        <a:lnSpc>
+                          <a:spcPct val="100000"/>
+                        </a:lnSpc>
+                        <a:spcBef>
+                          <a:spcPts val="0"/>
+                        </a:spcBef>
+                        <a:spcAft>
+                          <a:spcPts val="0"/>
+                        </a:spcAft>
+                        <a:buClr>
+                          <a:srgbClr val="000000"/>
+                        </a:buClr>
+                        <a:buFont typeface="Arial"/>
+                      </a:pPr>
+                      <a:r>
+                        <a:rPr lang="es-PE" sz="1100" b="0" i="0" u="none" strike="noStrike" cap="none" dirty="0" smtClean="0">
+                          <a:solidFill>
+                            <a:srgbClr val="000000"/>
+                          </a:solidFill>
+                          <a:latin typeface="Arial"/>
+                          <a:cs typeface="Arial"/>
+                          <a:sym typeface="Arial"/>
+                        </a:rPr>
+                        <a:t>-</a:t>
+                      </a:r>
+                      <a:endParaRPr lang="es-PE" sz="1100" b="0" i="0" u="none" strike="noStrike" cap="none" dirty="0">
+                        <a:solidFill>
+                          <a:srgbClr val="000000"/>
+                        </a:solidFill>
+                        <a:latin typeface="Arial"/>
+                        <a:cs typeface="Arial"/>
+                        <a:sym typeface="Arial"/>
+                      </a:endParaRPr>
+                    </a:p>
+                  </a:txBody>
+                  <a:tcPr marL="121920" marR="121920" marT="60960" marB="60960" anchor="ctr"/>
+                </a:tc>
+                <a:tc>
+                  <a:txBody>
+                    <a:bodyPr/>
+                    <a:lstStyle/>
+                    <a:p>
+                      <a:pPr marR="0" algn="ctr" rtl="0">
+                        <a:lnSpc>
+                          <a:spcPct val="100000"/>
+                        </a:lnSpc>
+                        <a:spcBef>
+                          <a:spcPts val="0"/>
+                        </a:spcBef>
+                        <a:spcAft>
+                          <a:spcPts val="0"/>
+                        </a:spcAft>
+                        <a:buClr>
+                          <a:srgbClr val="000000"/>
+                        </a:buClr>
+                        <a:buFont typeface="Arial"/>
+                      </a:pPr>
+                      <a:r>
+                        <a:rPr lang="es-PE" sz="1100" b="0" i="0" u="none" strike="noStrike" cap="none" dirty="0" smtClean="0">
+                          <a:solidFill>
+                            <a:srgbClr val="000000"/>
+                          </a:solidFill>
+                          <a:latin typeface="Arial"/>
+                          <a:cs typeface="Arial"/>
+                          <a:sym typeface="Arial"/>
+                        </a:rPr>
+                        <a:t>49249</a:t>
+                      </a:r>
+                      <a:endParaRPr lang="es-PE" sz="1100" b="0" i="0" u="none" strike="noStrike" cap="none" dirty="0">
+                        <a:solidFill>
+                          <a:srgbClr val="000000"/>
+                        </a:solidFill>
+                        <a:latin typeface="Arial"/>
+                        <a:cs typeface="Arial"/>
+                        <a:sym typeface="Arial"/>
+                      </a:endParaRPr>
+                    </a:p>
+                  </a:txBody>
+                  <a:tcPr marL="121920" marR="121920" marT="60960" marB="60960" anchor="ctr"/>
                 </a:tc>
                 <a:tc>
                   <a:txBody>
@@ -6165,9 +6399,9 @@
                     <a:bodyPr/>
                     <a:lstStyle/>
                     <a:p>
-                      <a:pPr marL="171450" indent="-171450" algn="l" defTabSz="914400" rtl="0" eaLnBrk="1" latinLnBrk="0" hangingPunct="1">
+                      <a:pPr marL="0" indent="0" algn="ctr" defTabSz="914400" rtl="0" eaLnBrk="1" latinLnBrk="0" hangingPunct="1">
                         <a:buFont typeface="Arial" panose="020B0604020202020204" pitchFamily="34" charset="0"/>
-                        <a:buChar char="•"/>
+                        <a:buNone/>
                       </a:pPr>
                       <a:r>
                         <a:rPr lang="es-PE" sz="1100" b="1" kern="1200" dirty="0" smtClean="0">
@@ -6199,7 +6433,7 @@
                     <a:bodyPr/>
                     <a:lstStyle/>
                     <a:p>
-                      <a:pPr marL="0" marR="0" indent="0" algn="l" defTabSz="914400" rtl="0" eaLnBrk="1" fontAlgn="auto" latinLnBrk="0" hangingPunct="1">
+                      <a:pPr marL="0" marR="0" indent="0" algn="ctr" defTabSz="914400" rtl="0" eaLnBrk="1" fontAlgn="auto" latinLnBrk="0" hangingPunct="1">
                         <a:lnSpc>
                           <a:spcPct val="100000"/>
                         </a:lnSpc>
@@ -6226,7 +6460,7 @@
                           </a:solidFill>
                           <a:sym typeface="Arial"/>
                         </a:rPr>
-                        <a:t>En Formulación</a:t>
+                        <a:t>EN FORMULACIÓN</a:t>
                       </a:r>
                       <a:endParaRPr lang="es-PE" sz="1100" b="0" i="0" u="none" strike="noStrike" cap="none" dirty="0" smtClean="0">
                         <a:solidFill>
@@ -6241,6 +6475,7 @@
                       </a:endParaRPr>
                     </a:p>
                     <a:p>
+                      <a:pPr algn="ctr"/>
                       <a:endParaRPr lang="es-PE" sz="1100" b="0" i="0" u="none" strike="noStrike" cap="none" dirty="0">
                         <a:solidFill>
                           <a:schemeClr val="tx1">
@@ -6261,7 +6496,7 @@
                     <a:bodyPr/>
                     <a:lstStyle/>
                     <a:p>
-                      <a:pPr marL="171450" marR="0" lvl="0" indent="-171450" algn="l" defTabSz="914400" rtl="0" eaLnBrk="1" fontAlgn="auto" latinLnBrk="0" hangingPunct="1">
+                      <a:pPr marL="171450" marR="0" lvl="0" indent="-171450" algn="ctr" defTabSz="914400" rtl="0" eaLnBrk="1" fontAlgn="auto" latinLnBrk="0" hangingPunct="1">
                         <a:lnSpc>
                           <a:spcPct val="100000"/>
                         </a:lnSpc>
@@ -6291,7 +6526,7 @@
                       </a:r>
                     </a:p>
                     <a:p>
-                      <a:pPr marL="171450" marR="0" lvl="0" indent="-171450" algn="l" defTabSz="914400" rtl="0" eaLnBrk="1" fontAlgn="auto" latinLnBrk="0" hangingPunct="1">
+                      <a:pPr marL="171450" marR="0" lvl="0" indent="-171450" algn="ctr" defTabSz="914400" rtl="0" eaLnBrk="1" fontAlgn="auto" latinLnBrk="0" hangingPunct="1">
                         <a:lnSpc>
                           <a:spcPct val="100000"/>
                         </a:lnSpc>
@@ -6329,7 +6564,7 @@
                       </a:endParaRPr>
                     </a:p>
                     <a:p>
-                      <a:pPr marL="0" marR="0" lvl="0" indent="0" algn="l" defTabSz="914400" rtl="0" eaLnBrk="1" fontAlgn="auto" latinLnBrk="0" hangingPunct="1">
+                      <a:pPr marL="0" marR="0" lvl="0" indent="0" algn="ctr" defTabSz="914400" rtl="0" eaLnBrk="1" fontAlgn="auto" latinLnBrk="0" hangingPunct="1">
                         <a:lnSpc>
                           <a:spcPct val="100000"/>
                         </a:lnSpc>
@@ -6358,7 +6593,7 @@
                     <a:bodyPr/>
                     <a:lstStyle/>
                     <a:p>
-                      <a:pPr marL="0" marR="0" lvl="0" indent="0" algn="l" defTabSz="914400" rtl="0" eaLnBrk="1" fontAlgn="auto" latinLnBrk="0" hangingPunct="1">
+                      <a:pPr marL="0" marR="0" lvl="0" indent="0" algn="ctr" defTabSz="914400" rtl="0" eaLnBrk="1" fontAlgn="auto" latinLnBrk="0" hangingPunct="1">
                         <a:lnSpc>
                           <a:spcPct val="100000"/>
                         </a:lnSpc>
@@ -6389,46 +6624,10 @@
                           <a:ea typeface="+mn-ea"/>
                           <a:cs typeface="+mn-cs"/>
                         </a:rPr>
-                        <a:t>Contrata o </a:t>
+                        <a:t>Para reprogramación</a:t>
                       </a:r>
                       <a:r>
-                        <a:rPr lang="es-PE" sz="1100" b="0" kern="1200" dirty="0" smtClean="0">
-                          <a:solidFill>
-                            <a:schemeClr val="tx1">
-                              <a:lumMod val="95000"/>
-                              <a:lumOff val="5000"/>
-                            </a:schemeClr>
-                          </a:solidFill>
-                          <a:latin typeface="+mn-lt"/>
-                          <a:ea typeface="+mn-ea"/>
-                          <a:cs typeface="+mn-cs"/>
-                          <a:sym typeface="Arial"/>
-                        </a:rPr>
-                        <a:t>Adm. Directa</a:t>
-                      </a:r>
-                    </a:p>
-                    <a:p>
-                      <a:pPr marL="0" marR="0" lvl="0" indent="0" algn="l" defTabSz="914400" rtl="0" eaLnBrk="1" fontAlgn="auto" latinLnBrk="0" hangingPunct="1">
-                        <a:lnSpc>
-                          <a:spcPct val="100000"/>
-                        </a:lnSpc>
-                        <a:spcBef>
-                          <a:spcPts val="0"/>
-                        </a:spcBef>
-                        <a:spcAft>
-                          <a:spcPts val="0"/>
-                        </a:spcAft>
-                        <a:buClr>
-                          <a:srgbClr val="000000"/>
-                        </a:buClr>
-                        <a:buSzTx/>
-                        <a:buFont typeface="Arial"/>
-                        <a:buNone/>
-                        <a:tabLst/>
-                        <a:defRPr/>
-                      </a:pPr>
-                      <a:r>
-                        <a:rPr lang="es-PE" sz="1100" b="0" kern="1200" dirty="0" smtClean="0">
+                        <a:rPr lang="es-PE" sz="1100" b="0" kern="1200" baseline="0" dirty="0" smtClean="0">
                           <a:solidFill>
                             <a:schemeClr val="tx1">
                               <a:lumMod val="95000"/>
@@ -6439,7 +6638,7 @@
                           <a:ea typeface="+mn-ea"/>
                           <a:cs typeface="+mn-cs"/>
                         </a:rPr>
-                        <a:t>(Definir)</a:t>
+                        <a:t> año 2020</a:t>
                       </a:r>
                       <a:endParaRPr lang="es-PE" sz="1100" b="0" kern="1200" dirty="0" smtClean="0">
                         <a:solidFill>
@@ -6482,7 +6681,7 @@
         </p:nvSpPr>
         <p:spPr>
           <a:xfrm>
-            <a:off x="641532" y="481659"/>
+            <a:off x="724854" y="0"/>
             <a:ext cx="10562741" cy="602007"/>
           </a:xfrm>
           <a:prstGeom prst="rect">
@@ -6758,6 +6957,310 @@
               </a:rPr>
               <a:t>Proyectos de Inversión Formulados-2019</a:t>
             </a:r>
+          </a:p>
+        </p:txBody>
+      </p:sp>
+      <p:sp>
+        <p:nvSpPr>
+          <p:cNvPr id="6" name="Google Shape;95;p13">
+            <a:extLst>
+              <a:ext uri="{FF2B5EF4-FFF2-40B4-BE49-F238E27FC236}">
+                <a16:creationId xmlns:a16="http://schemas.microsoft.com/office/drawing/2014/main" id="{7DB9BA98-6BEB-4F68-8F37-ADE0EF83B1E6}"/>
+              </a:ext>
+            </a:extLst>
+          </p:cNvPr>
+          <p:cNvSpPr txBox="1">
+            <a:spLocks/>
+          </p:cNvSpPr>
+          <p:nvPr/>
+        </p:nvSpPr>
+        <p:spPr>
+          <a:xfrm>
+            <a:off x="724854" y="462643"/>
+            <a:ext cx="10562741" cy="602007"/>
+          </a:xfrm>
+          <a:prstGeom prst="rect">
+            <a:avLst/>
+          </a:prstGeom>
+          <a:noFill/>
+          <a:ln>
+            <a:noFill/>
+          </a:ln>
+        </p:spPr>
+        <p:txBody>
+          <a:bodyPr spcFirstLastPara="1" wrap="square" lIns="0" tIns="0" rIns="0" bIns="0" anchor="b" anchorCtr="0">
+            <a:noAutofit/>
+          </a:bodyPr>
+          <a:lstStyle>
+            <a:defPPr marR="0" lvl="0" algn="l" rtl="0">
+              <a:lnSpc>
+                <a:spcPct val="100000"/>
+              </a:lnSpc>
+              <a:spcBef>
+                <a:spcPts val="0"/>
+              </a:spcBef>
+              <a:spcAft>
+                <a:spcPts val="0"/>
+              </a:spcAft>
+            </a:defPPr>
+            <a:lvl1pPr marR="0" lvl="0" algn="l" rtl="0">
+              <a:lnSpc>
+                <a:spcPct val="100000"/>
+              </a:lnSpc>
+              <a:spcBef>
+                <a:spcPts val="0"/>
+              </a:spcBef>
+              <a:spcAft>
+                <a:spcPts val="0"/>
+              </a:spcAft>
+              <a:buClr>
+                <a:schemeClr val="dk1"/>
+              </a:buClr>
+              <a:buSzPts val="5400"/>
+              <a:buFont typeface="Lato Black"/>
+              <a:buNone/>
+              <a:defRPr sz="5400" b="0" i="0" u="none" strike="noStrike" cap="none">
+                <a:solidFill>
+                  <a:schemeClr val="dk1"/>
+                </a:solidFill>
+                <a:latin typeface="Lato Black"/>
+                <a:ea typeface="Lato Black"/>
+                <a:cs typeface="Lato Black"/>
+                <a:sym typeface="Lato Black"/>
+              </a:defRPr>
+            </a:lvl1pPr>
+            <a:lvl2pPr marR="0" lvl="1" algn="l" rtl="0">
+              <a:lnSpc>
+                <a:spcPct val="100000"/>
+              </a:lnSpc>
+              <a:spcBef>
+                <a:spcPts val="0"/>
+              </a:spcBef>
+              <a:spcAft>
+                <a:spcPts val="0"/>
+              </a:spcAft>
+              <a:buClr>
+                <a:schemeClr val="dk1"/>
+              </a:buClr>
+              <a:buSzPts val="5400"/>
+              <a:buFont typeface="Lato Black"/>
+              <a:buNone/>
+              <a:defRPr sz="5400" b="0" i="0" u="none" strike="noStrike" cap="none">
+                <a:solidFill>
+                  <a:schemeClr val="dk1"/>
+                </a:solidFill>
+                <a:latin typeface="Lato Black"/>
+                <a:ea typeface="Lato Black"/>
+                <a:cs typeface="Lato Black"/>
+                <a:sym typeface="Lato Black"/>
+              </a:defRPr>
+            </a:lvl2pPr>
+            <a:lvl3pPr marR="0" lvl="2" algn="l" rtl="0">
+              <a:lnSpc>
+                <a:spcPct val="100000"/>
+              </a:lnSpc>
+              <a:spcBef>
+                <a:spcPts val="0"/>
+              </a:spcBef>
+              <a:spcAft>
+                <a:spcPts val="0"/>
+              </a:spcAft>
+              <a:buClr>
+                <a:schemeClr val="dk1"/>
+              </a:buClr>
+              <a:buSzPts val="5400"/>
+              <a:buFont typeface="Lato Black"/>
+              <a:buNone/>
+              <a:defRPr sz="5400" b="0" i="0" u="none" strike="noStrike" cap="none">
+                <a:solidFill>
+                  <a:schemeClr val="dk1"/>
+                </a:solidFill>
+                <a:latin typeface="Lato Black"/>
+                <a:ea typeface="Lato Black"/>
+                <a:cs typeface="Lato Black"/>
+                <a:sym typeface="Lato Black"/>
+              </a:defRPr>
+            </a:lvl3pPr>
+            <a:lvl4pPr marR="0" lvl="3" algn="l" rtl="0">
+              <a:lnSpc>
+                <a:spcPct val="100000"/>
+              </a:lnSpc>
+              <a:spcBef>
+                <a:spcPts val="0"/>
+              </a:spcBef>
+              <a:spcAft>
+                <a:spcPts val="0"/>
+              </a:spcAft>
+              <a:buClr>
+                <a:schemeClr val="dk1"/>
+              </a:buClr>
+              <a:buSzPts val="5400"/>
+              <a:buFont typeface="Lato Black"/>
+              <a:buNone/>
+              <a:defRPr sz="5400" b="0" i="0" u="none" strike="noStrike" cap="none">
+                <a:solidFill>
+                  <a:schemeClr val="dk1"/>
+                </a:solidFill>
+                <a:latin typeface="Lato Black"/>
+                <a:ea typeface="Lato Black"/>
+                <a:cs typeface="Lato Black"/>
+                <a:sym typeface="Lato Black"/>
+              </a:defRPr>
+            </a:lvl4pPr>
+            <a:lvl5pPr marR="0" lvl="4" algn="l" rtl="0">
+              <a:lnSpc>
+                <a:spcPct val="100000"/>
+              </a:lnSpc>
+              <a:spcBef>
+                <a:spcPts val="0"/>
+              </a:spcBef>
+              <a:spcAft>
+                <a:spcPts val="0"/>
+              </a:spcAft>
+              <a:buClr>
+                <a:schemeClr val="dk1"/>
+              </a:buClr>
+              <a:buSzPts val="5400"/>
+              <a:buFont typeface="Lato Black"/>
+              <a:buNone/>
+              <a:defRPr sz="5400" b="0" i="0" u="none" strike="noStrike" cap="none">
+                <a:solidFill>
+                  <a:schemeClr val="dk1"/>
+                </a:solidFill>
+                <a:latin typeface="Lato Black"/>
+                <a:ea typeface="Lato Black"/>
+                <a:cs typeface="Lato Black"/>
+                <a:sym typeface="Lato Black"/>
+              </a:defRPr>
+            </a:lvl5pPr>
+            <a:lvl6pPr marR="0" lvl="5" algn="l" rtl="0">
+              <a:lnSpc>
+                <a:spcPct val="100000"/>
+              </a:lnSpc>
+              <a:spcBef>
+                <a:spcPts val="0"/>
+              </a:spcBef>
+              <a:spcAft>
+                <a:spcPts val="0"/>
+              </a:spcAft>
+              <a:buClr>
+                <a:schemeClr val="dk1"/>
+              </a:buClr>
+              <a:buSzPts val="5400"/>
+              <a:buFont typeface="Lato Black"/>
+              <a:buNone/>
+              <a:defRPr sz="5400" b="0" i="0" u="none" strike="noStrike" cap="none">
+                <a:solidFill>
+                  <a:schemeClr val="dk1"/>
+                </a:solidFill>
+                <a:latin typeface="Lato Black"/>
+                <a:ea typeface="Lato Black"/>
+                <a:cs typeface="Lato Black"/>
+                <a:sym typeface="Lato Black"/>
+              </a:defRPr>
+            </a:lvl6pPr>
+            <a:lvl7pPr marR="0" lvl="6" algn="l" rtl="0">
+              <a:lnSpc>
+                <a:spcPct val="100000"/>
+              </a:lnSpc>
+              <a:spcBef>
+                <a:spcPts val="0"/>
+              </a:spcBef>
+              <a:spcAft>
+                <a:spcPts val="0"/>
+              </a:spcAft>
+              <a:buClr>
+                <a:schemeClr val="dk1"/>
+              </a:buClr>
+              <a:buSzPts val="5400"/>
+              <a:buFont typeface="Lato Black"/>
+              <a:buNone/>
+              <a:defRPr sz="5400" b="0" i="0" u="none" strike="noStrike" cap="none">
+                <a:solidFill>
+                  <a:schemeClr val="dk1"/>
+                </a:solidFill>
+                <a:latin typeface="Lato Black"/>
+                <a:ea typeface="Lato Black"/>
+                <a:cs typeface="Lato Black"/>
+                <a:sym typeface="Lato Black"/>
+              </a:defRPr>
+            </a:lvl7pPr>
+            <a:lvl8pPr marR="0" lvl="7" algn="l" rtl="0">
+              <a:lnSpc>
+                <a:spcPct val="100000"/>
+              </a:lnSpc>
+              <a:spcBef>
+                <a:spcPts val="0"/>
+              </a:spcBef>
+              <a:spcAft>
+                <a:spcPts val="0"/>
+              </a:spcAft>
+              <a:buClr>
+                <a:schemeClr val="dk1"/>
+              </a:buClr>
+              <a:buSzPts val="5400"/>
+              <a:buFont typeface="Lato Black"/>
+              <a:buNone/>
+              <a:defRPr sz="5400" b="0" i="0" u="none" strike="noStrike" cap="none">
+                <a:solidFill>
+                  <a:schemeClr val="dk1"/>
+                </a:solidFill>
+                <a:latin typeface="Lato Black"/>
+                <a:ea typeface="Lato Black"/>
+                <a:cs typeface="Lato Black"/>
+                <a:sym typeface="Lato Black"/>
+              </a:defRPr>
+            </a:lvl8pPr>
+            <a:lvl9pPr marR="0" lvl="8" algn="l" rtl="0">
+              <a:lnSpc>
+                <a:spcPct val="100000"/>
+              </a:lnSpc>
+              <a:spcBef>
+                <a:spcPts val="0"/>
+              </a:spcBef>
+              <a:spcAft>
+                <a:spcPts val="0"/>
+              </a:spcAft>
+              <a:buClr>
+                <a:schemeClr val="dk1"/>
+              </a:buClr>
+              <a:buSzPts val="5400"/>
+              <a:buFont typeface="Lato Black"/>
+              <a:buNone/>
+              <a:defRPr sz="5400" b="0" i="0" u="none" strike="noStrike" cap="none">
+                <a:solidFill>
+                  <a:schemeClr val="dk1"/>
+                </a:solidFill>
+                <a:latin typeface="Lato Black"/>
+                <a:ea typeface="Lato Black"/>
+                <a:cs typeface="Lato Black"/>
+                <a:sym typeface="Lato Black"/>
+              </a:defRPr>
+            </a:lvl9pPr>
+          </a:lstStyle>
+          <a:p>
+            <a:pPr algn="ctr"/>
+            <a:r>
+              <a:rPr lang="es-MX" sz="2800" dirty="0" smtClean="0">
+                <a:effectLst>
+                  <a:outerShdw blurRad="38100" dist="38100" dir="2700000" algn="tl">
+                    <a:srgbClr val="000000">
+                      <a:alpha val="43137"/>
+                    </a:srgbClr>
+                  </a:outerShdw>
+                </a:effectLst>
+              </a:rPr>
+              <a:t>FUNCION AMBIENTE</a:t>
+            </a:r>
+            <a:endParaRPr lang="es-MX" sz="2800" dirty="0">
+              <a:effectLst>
+                <a:outerShdw blurRad="38100" dist="38100" dir="2700000" algn="tl">
+                  <a:srgbClr val="000000">
+                    <a:alpha val="43137"/>
+                  </a:srgbClr>
+                </a:outerShdw>
+              </a:effectLst>
+            </a:endParaRPr>
           </a:p>
         </p:txBody>
       </p:sp>
@@ -6803,7 +7306,7 @@
         </p:nvSpPr>
         <p:spPr>
           <a:xfrm>
-            <a:off x="792051" y="406401"/>
+            <a:off x="744704" y="108133"/>
             <a:ext cx="10562741" cy="1173976"/>
           </a:xfrm>
           <a:prstGeom prst="rect">
@@ -6890,14 +7393,14 @@
           <p:nvPr>
             <p:extLst>
               <p:ext uri="{D42A27DB-BD31-4B8C-83A1-F6EECF244321}">
-                <p14:modId xmlns:p14="http://schemas.microsoft.com/office/powerpoint/2010/main" val="620562668"/>
+                <p14:modId xmlns:p14="http://schemas.microsoft.com/office/powerpoint/2010/main" val="3062127141"/>
               </p:ext>
             </p:extLst>
           </p:nvPr>
         </p:nvGraphicFramePr>
         <p:xfrm>
           <a:off x="255880" y="1884116"/>
-          <a:ext cx="11783165" cy="3459480"/>
+          <a:ext cx="11783165" cy="4130040"/>
         </p:xfrm>
         <a:graphic>
           <a:graphicData uri="http://schemas.openxmlformats.org/drawingml/2006/table">
@@ -6906,49 +7409,56 @@
                 <a:tableStyleId>{5A111915-BE36-4E01-A7E5-04B1672EAD32}</a:tableStyleId>
               </a:tblPr>
               <a:tblGrid>
-                <a:gridCol w="542924">
+                <a:gridCol w="519010">
                   <a:extLst>
                     <a:ext uri="{9D8B030D-6E8A-4147-A177-3AD203B41FA5}">
                       <a16:colId xmlns:a16="http://schemas.microsoft.com/office/drawing/2014/main" val="3565300996"/>
                     </a:ext>
                   </a:extLst>
                 </a:gridCol>
-                <a:gridCol w="5051411">
+                <a:gridCol w="719174">
+                  <a:extLst>
+                    <a:ext uri="{9D8B030D-6E8A-4147-A177-3AD203B41FA5}">
+                      <a16:colId xmlns:a16="http://schemas.microsoft.com/office/drawing/2014/main" val="2567852907"/>
+                    </a:ext>
+                  </a:extLst>
+                </a:gridCol>
+                <a:gridCol w="4628749">
                   <a:extLst>
                     <a:ext uri="{9D8B030D-6E8A-4147-A177-3AD203B41FA5}">
                       <a16:colId xmlns:a16="http://schemas.microsoft.com/office/drawing/2014/main" val="1429739352"/>
                     </a:ext>
                   </a:extLst>
                 </a:gridCol>
-                <a:gridCol w="1326622">
+                <a:gridCol w="1268189">
                   <a:extLst>
                     <a:ext uri="{9D8B030D-6E8A-4147-A177-3AD203B41FA5}">
                       <a16:colId xmlns:a16="http://schemas.microsoft.com/office/drawing/2014/main" val="1073880851"/>
                     </a:ext>
                   </a:extLst>
                 </a:gridCol>
-                <a:gridCol w="1149487">
+                <a:gridCol w="952898">
                   <a:extLst>
                     <a:ext uri="{9D8B030D-6E8A-4147-A177-3AD203B41FA5}">
                       <a16:colId xmlns:a16="http://schemas.microsoft.com/office/drawing/2014/main" val="4239792826"/>
                     </a:ext>
                   </a:extLst>
                 </a:gridCol>
-                <a:gridCol w="991108">
+                <a:gridCol w="1004207">
                   <a:extLst>
                     <a:ext uri="{9D8B030D-6E8A-4147-A177-3AD203B41FA5}">
                       <a16:colId xmlns:a16="http://schemas.microsoft.com/office/drawing/2014/main" val="2844200124"/>
                     </a:ext>
                   </a:extLst>
                 </a:gridCol>
-                <a:gridCol w="1625264">
+                <a:gridCol w="1642880">
                   <a:extLst>
                     <a:ext uri="{9D8B030D-6E8A-4147-A177-3AD203B41FA5}">
                       <a16:colId xmlns:a16="http://schemas.microsoft.com/office/drawing/2014/main" val="3466243991"/>
                     </a:ext>
                   </a:extLst>
                 </a:gridCol>
-                <a:gridCol w="1096349">
+                <a:gridCol w="1048058">
                   <a:extLst>
                     <a:ext uri="{9D8B030D-6E8A-4147-A177-3AD203B41FA5}">
                       <a16:colId xmlns:a16="http://schemas.microsoft.com/office/drawing/2014/main" val="1146080519"/>
@@ -6969,14 +7479,32 @@
                       </a:r>
                     </a:p>
                   </a:txBody>
-                  <a:tcPr marL="121920" marR="121920" marT="60960" marB="60960"/>
+                  <a:tcPr marL="121920" marR="121920" marT="60960" marB="60960" anchor="ctr"/>
                 </a:tc>
                 <a:tc>
                   <a:txBody>
                     <a:bodyPr/>
                     <a:lstStyle/>
                     <a:p>
-                      <a:pPr marL="0" marR="0" lvl="0" indent="0" algn="l" defTabSz="914400" rtl="0" eaLnBrk="1" fontAlgn="auto" latinLnBrk="0" hangingPunct="1">
+                      <a:pPr algn="ctr"/>
+                      <a:r>
+                        <a:rPr lang="es-PE" sz="1100" dirty="0" smtClean="0"/>
+                        <a:t>CODIGO DE IDEA</a:t>
+                      </a:r>
+                    </a:p>
+                    <a:p>
+                      <a:pPr algn="ctr"/>
+                      <a:endParaRPr lang="es-PE" sz="1100" dirty="0"/>
+                    </a:p>
+                  </a:txBody>
+                  <a:tcPr marL="121920" marR="121920" marT="60960" marB="60960" anchor="ctr"/>
+                </a:tc>
+                <a:tc>
+                  <a:txBody>
+                    <a:bodyPr/>
+                    <a:lstStyle/>
+                    <a:p>
+                      <a:pPr marL="0" marR="0" lvl="0" indent="0" algn="ctr" defTabSz="914400" rtl="0" eaLnBrk="1" fontAlgn="auto" latinLnBrk="0" hangingPunct="1">
                         <a:lnSpc>
                           <a:spcPct val="100000"/>
                         </a:lnSpc>
@@ -6996,19 +7524,20 @@
                         <a:defRPr/>
                       </a:pPr>
                       <a:r>
-                        <a:rPr lang="es-PE" sz="1100" b="1" dirty="0"/>
-                        <a:t>Proyectos</a:t>
+                        <a:rPr lang="es-PE" sz="1100" b="1" dirty="0" smtClean="0"/>
+                        <a:t>NOMBRE DEL PROYECTO DE INVERSIÓN</a:t>
                       </a:r>
+                      <a:endParaRPr lang="es-PE" sz="1100" b="1" dirty="0"/>
                     </a:p>
                   </a:txBody>
-                  <a:tcPr marL="121920" marR="121920" marT="60960" marB="60960"/>
+                  <a:tcPr marL="121920" marR="121920" marT="60960" marB="60960" anchor="ctr"/>
                 </a:tc>
                 <a:tc>
                   <a:txBody>
                     <a:bodyPr/>
                     <a:lstStyle/>
                     <a:p>
-                      <a:pPr marL="0" marR="0" lvl="0" indent="0" algn="l" defTabSz="914400" rtl="0" eaLnBrk="1" fontAlgn="auto" latinLnBrk="0" hangingPunct="1">
+                      <a:pPr marL="0" marR="0" lvl="0" indent="0" algn="ctr" defTabSz="914400" rtl="0" eaLnBrk="1" fontAlgn="auto" latinLnBrk="0" hangingPunct="1">
                         <a:lnSpc>
                           <a:spcPct val="100000"/>
                         </a:lnSpc>
@@ -7033,14 +7562,14 @@
                       </a:r>
                     </a:p>
                   </a:txBody>
-                  <a:tcPr marL="121920" marR="121920" marT="60960" marB="60960"/>
+                  <a:tcPr marL="121920" marR="121920" marT="60960" marB="60960" anchor="ctr"/>
                 </a:tc>
                 <a:tc>
                   <a:txBody>
                     <a:bodyPr/>
                     <a:lstStyle/>
                     <a:p>
-                      <a:pPr marL="0" marR="0" lvl="0" indent="0" algn="l" defTabSz="914400" rtl="0" eaLnBrk="1" fontAlgn="auto" latinLnBrk="0" hangingPunct="1">
+                      <a:pPr marL="0" marR="0" lvl="0" indent="0" algn="ctr" defTabSz="914400" rtl="0" eaLnBrk="1" fontAlgn="auto" latinLnBrk="0" hangingPunct="1">
                         <a:lnSpc>
                           <a:spcPct val="100000"/>
                         </a:lnSpc>
@@ -7065,14 +7594,14 @@
                       </a:r>
                     </a:p>
                   </a:txBody>
-                  <a:tcPr marL="121920" marR="121920" marT="60960" marB="60960"/>
+                  <a:tcPr marL="121920" marR="121920" marT="60960" marB="60960" anchor="ctr"/>
                 </a:tc>
                 <a:tc>
                   <a:txBody>
                     <a:bodyPr/>
                     <a:lstStyle/>
                     <a:p>
-                      <a:pPr marL="0" marR="0" lvl="0" indent="0" algn="l" defTabSz="914400" rtl="0" eaLnBrk="1" fontAlgn="auto" latinLnBrk="0" hangingPunct="1">
+                      <a:pPr marL="0" marR="0" lvl="0" indent="0" algn="ctr" defTabSz="914400" rtl="0" eaLnBrk="1" fontAlgn="auto" latinLnBrk="0" hangingPunct="1">
                         <a:lnSpc>
                           <a:spcPct val="100000"/>
                         </a:lnSpc>
@@ -7097,14 +7626,14 @@
                       </a:r>
                     </a:p>
                   </a:txBody>
-                  <a:tcPr marL="121920" marR="121920" marT="60960" marB="60960"/>
+                  <a:tcPr marL="121920" marR="121920" marT="60960" marB="60960" anchor="ctr"/>
                 </a:tc>
                 <a:tc>
                   <a:txBody>
                     <a:bodyPr/>
                     <a:lstStyle/>
                     <a:p>
-                      <a:pPr marL="0" marR="0" lvl="0" indent="0" algn="l" defTabSz="914400" rtl="0" eaLnBrk="1" fontAlgn="auto" latinLnBrk="0" hangingPunct="1">
+                      <a:pPr marL="0" marR="0" lvl="0" indent="0" algn="ctr" defTabSz="914400" rtl="0" eaLnBrk="1" fontAlgn="auto" latinLnBrk="0" hangingPunct="1">
                         <a:lnSpc>
                           <a:spcPct val="100000"/>
                         </a:lnSpc>
@@ -7129,14 +7658,14 @@
                       </a:r>
                     </a:p>
                   </a:txBody>
-                  <a:tcPr marL="121920" marR="121920" marT="60960" marB="60960"/>
+                  <a:tcPr marL="121920" marR="121920" marT="60960" marB="60960" anchor="ctr"/>
                 </a:tc>
                 <a:tc>
                   <a:txBody>
                     <a:bodyPr/>
                     <a:lstStyle/>
                     <a:p>
-                      <a:pPr marL="0" marR="0" lvl="0" indent="0" algn="l" defTabSz="914400" rtl="0" eaLnBrk="1" fontAlgn="auto" latinLnBrk="0" hangingPunct="1">
+                      <a:pPr marL="0" marR="0" lvl="0" indent="0" algn="ctr" defTabSz="914400" rtl="0" eaLnBrk="1" fontAlgn="auto" latinLnBrk="0" hangingPunct="1">
                         <a:lnSpc>
                           <a:spcPct val="100000"/>
                         </a:lnSpc>
@@ -7161,7 +7690,7 @@
                       </a:r>
                     </a:p>
                   </a:txBody>
-                  <a:tcPr marL="121920" marR="121920" marT="60960" marB="60960"/>
+                  <a:tcPr marL="121920" marR="121920" marT="60960" marB="60960" anchor="ctr"/>
                 </a:tc>
                 <a:extLst>
                   <a:ext uri="{0D108BD9-81ED-4DB2-BD59-A6C34878D82A}">
@@ -7204,7 +7733,22 @@
                       <a:endParaRPr lang="es-PE" sz="1100" dirty="0"/>
                     </a:p>
                   </a:txBody>
-                  <a:tcPr marL="121920" marR="121920" marT="60960" marB="60960"/>
+                  <a:tcPr marL="121920" marR="121920" marT="60960" marB="60960" anchor="ctr"/>
+                </a:tc>
+                <a:tc>
+                  <a:txBody>
+                    <a:bodyPr/>
+                    <a:lstStyle/>
+                    <a:p>
+                      <a:pPr algn="ctr"/>
+                      <a:r>
+                        <a:rPr lang="es-PE" sz="1100" dirty="0" smtClean="0"/>
+                        <a:t>48932</a:t>
+                      </a:r>
+                      <a:endParaRPr lang="es-PE" sz="1100" dirty="0"/>
+                    </a:p>
+                  </a:txBody>
+                  <a:tcPr marL="121920" marR="121920" marT="60960" marB="60960" anchor="ctr"/>
                 </a:tc>
                 <a:tc>
                   <a:txBody>
@@ -7244,7 +7788,7 @@
                     <a:bodyPr/>
                     <a:lstStyle/>
                     <a:p>
-                      <a:pPr marL="171450" marR="0" lvl="0" indent="-171450" algn="l" defTabSz="914400" rtl="0" eaLnBrk="1" fontAlgn="auto" latinLnBrk="0" hangingPunct="1">
+                      <a:pPr marL="0" marR="0" lvl="0" indent="0" algn="l" defTabSz="914400" rtl="0" eaLnBrk="1" fontAlgn="auto" latinLnBrk="0" hangingPunct="1">
                         <a:lnSpc>
                           <a:spcPct val="100000"/>
                         </a:lnSpc>
@@ -7259,7 +7803,7 @@
                         </a:buClr>
                         <a:buSzTx/>
                         <a:buFont typeface="Arial" panose="020B0604020202020204" pitchFamily="34" charset="0"/>
-                        <a:buChar char="•"/>
+                        <a:buNone/>
                         <a:tabLst/>
                         <a:defRPr/>
                       </a:pPr>
@@ -7383,7 +7927,7 @@
                     <a:bodyPr/>
                     <a:lstStyle/>
                     <a:p>
-                      <a:pPr marL="171450" marR="0" lvl="0" indent="-171450" algn="l" defTabSz="914400" rtl="0" eaLnBrk="1" fontAlgn="auto" latinLnBrk="0" hangingPunct="1">
+                      <a:pPr marL="0" marR="0" lvl="0" indent="0" algn="l" defTabSz="914400" rtl="0" eaLnBrk="1" fontAlgn="auto" latinLnBrk="0" hangingPunct="1">
                         <a:lnSpc>
                           <a:spcPct val="100000"/>
                         </a:lnSpc>
@@ -7398,15 +7942,44 @@
                         </a:buClr>
                         <a:buSzTx/>
                         <a:buFont typeface="Arial" panose="020B0604020202020204" pitchFamily="34" charset="0"/>
-                        <a:buChar char="•"/>
+                        <a:buNone/>
                         <a:tabLst/>
                         <a:defRPr/>
                       </a:pPr>
                       <a:r>
                         <a:rPr lang="es-PE" sz="1100" b="0" dirty="0" smtClean="0"/>
-                        <a:t>10 Distritos</a:t>
+                        <a:t>10 Distritos de</a:t>
                       </a:r>
-                      <a:endParaRPr lang="es-PE" sz="1100" b="0" dirty="0"/>
+                      <a:r>
+                        <a:rPr lang="es-PE" sz="1100" b="0" baseline="0" dirty="0" smtClean="0"/>
+                        <a:t> las</a:t>
+                      </a:r>
+                      <a:endParaRPr lang="es-PE" sz="1100" b="0" dirty="0" smtClean="0"/>
+                    </a:p>
+                    <a:p>
+                      <a:pPr marL="0" marR="0" lvl="0" indent="0" algn="l" defTabSz="914400" rtl="0" eaLnBrk="1" fontAlgn="auto" latinLnBrk="0" hangingPunct="1">
+                        <a:lnSpc>
+                          <a:spcPct val="100000"/>
+                        </a:lnSpc>
+                        <a:spcBef>
+                          <a:spcPts val="0"/>
+                        </a:spcBef>
+                        <a:spcAft>
+                          <a:spcPts val="0"/>
+                        </a:spcAft>
+                        <a:buClr>
+                          <a:srgbClr val="000000"/>
+                        </a:buClr>
+                        <a:buSzTx/>
+                        <a:buFont typeface="Arial" panose="020B0604020202020204" pitchFamily="34" charset="0"/>
+                        <a:buNone/>
+                        <a:tabLst/>
+                        <a:defRPr/>
+                      </a:pPr>
+                      <a:r>
+                        <a:rPr lang="es-PE" sz="1100" b="0" dirty="0" smtClean="0"/>
+                        <a:t>Provincias de Antabamba y Aymaraes </a:t>
+                      </a:r>
                     </a:p>
                     <a:p>
                       <a:pPr marL="0" marR="0" lvl="0" indent="0" algn="l" defTabSz="914400" rtl="0" eaLnBrk="1" fontAlgn="auto" latinLnBrk="0" hangingPunct="1">
@@ -7571,7 +8144,50 @@
                       </a:endParaRPr>
                     </a:p>
                   </a:txBody>
-                  <a:tcPr marL="121920" marR="121920" marT="60960" marB="60960"/>
+                  <a:tcPr marL="121920" marR="121920" marT="60960" marB="60960" anchor="ctr"/>
+                </a:tc>
+                <a:tc>
+                  <a:txBody>
+                    <a:bodyPr/>
+                    <a:lstStyle/>
+                    <a:p>
+                      <a:pPr marR="0" algn="ctr" rtl="0">
+                        <a:lnSpc>
+                          <a:spcPct val="100000"/>
+                        </a:lnSpc>
+                        <a:spcBef>
+                          <a:spcPts val="0"/>
+                        </a:spcBef>
+                        <a:spcAft>
+                          <a:spcPts val="0"/>
+                        </a:spcAft>
+                        <a:buClr>
+                          <a:srgbClr val="000000"/>
+                        </a:buClr>
+                        <a:buFont typeface="Arial"/>
+                      </a:pPr>
+                      <a:r>
+                        <a:rPr lang="es-PE" sz="1100" b="0" i="0" u="none" strike="noStrike" cap="none" dirty="0" smtClean="0">
+                          <a:solidFill>
+                            <a:srgbClr val="000000"/>
+                          </a:solidFill>
+                          <a:latin typeface="Arial"/>
+                          <a:cs typeface="Arial"/>
+                          <a:sym typeface="Arial"/>
+                        </a:rPr>
+                        <a:t>107108</a:t>
+                      </a:r>
+                      <a:endParaRPr lang="es-PE" sz="1100" b="0" i="0" u="none" strike="noStrike" cap="none" dirty="0">
+                        <a:solidFill>
+                          <a:srgbClr val="000000"/>
+                        </a:solidFill>
+                        <a:latin typeface="Arial"/>
+                        <a:cs typeface="Arial"/>
+                        <a:sym typeface="Arial"/>
+                      </a:endParaRPr>
+                    </a:p>
+                  </a:txBody>
+                  <a:tcPr marL="121920" marR="121920" marT="60960" marB="60960" anchor="ctr"/>
                 </a:tc>
                 <a:tc>
                   <a:txBody>
@@ -7623,7 +8239,7 @@
                     <a:bodyPr/>
                     <a:lstStyle/>
                     <a:p>
-                      <a:pPr marL="171450" marR="0" lvl="0" indent="-171450" algn="l" defTabSz="914400" rtl="0" eaLnBrk="1" fontAlgn="auto" latinLnBrk="0" hangingPunct="1">
+                      <a:pPr marL="0" marR="0" lvl="0" indent="0" algn="l" defTabSz="914400" rtl="0" eaLnBrk="1" fontAlgn="auto" latinLnBrk="0" hangingPunct="1">
                         <a:lnSpc>
                           <a:spcPct val="100000"/>
                         </a:lnSpc>
@@ -7638,7 +8254,7 @@
                         </a:buClr>
                         <a:buSzTx/>
                         <a:buFont typeface="Arial" panose="020B0604020202020204" pitchFamily="34" charset="0"/>
-                        <a:buChar char="•"/>
+                        <a:buNone/>
                         <a:tabLst/>
                         <a:defRPr/>
                       </a:pPr>
@@ -7715,7 +8331,7 @@
                     <a:bodyPr/>
                     <a:lstStyle/>
                     <a:p>
-                      <a:pPr marL="171450" marR="0" lvl="0" indent="-171450" algn="l" defTabSz="914400" rtl="0" eaLnBrk="1" fontAlgn="auto" latinLnBrk="0" hangingPunct="1">
+                      <a:pPr marL="0" marR="0" lvl="0" indent="0" algn="l" defTabSz="914400" rtl="0" eaLnBrk="1" fontAlgn="auto" latinLnBrk="0" hangingPunct="1">
                         <a:lnSpc>
                           <a:spcPct val="100000"/>
                         </a:lnSpc>
@@ -7730,14 +8346,65 @@
                         </a:buClr>
                         <a:buSzTx/>
                         <a:buFont typeface="Arial" panose="020B0604020202020204" pitchFamily="34" charset="0"/>
-                        <a:buChar char="•"/>
+                        <a:buNone/>
                         <a:tabLst/>
                         <a:defRPr/>
                       </a:pPr>
                       <a:r>
                         <a:rPr lang="es-PE" sz="800" b="0" i="0" u="none" strike="noStrike" cap="none" dirty="0" smtClean="0">
                           <a:solidFill>
-                            <a:srgbClr val="000000"/>
+                            <a:srgbClr val="FF0000"/>
+                          </a:solidFill>
+                          <a:latin typeface="Arial"/>
+                          <a:cs typeface="Arial"/>
+                          <a:sym typeface="Arial"/>
+                        </a:rPr>
+                        <a:t>No</a:t>
+                      </a:r>
+                      <a:r>
+                        <a:rPr lang="es-PE" sz="800" b="0" i="0" u="none" strike="noStrike" cap="none" baseline="0" dirty="0" smtClean="0">
+                          <a:solidFill>
+                            <a:srgbClr val="FF0000"/>
+                          </a:solidFill>
+                          <a:latin typeface="Arial"/>
+                          <a:cs typeface="Arial"/>
+                          <a:sym typeface="Arial"/>
+                        </a:rPr>
+                        <a:t> cuenta con</a:t>
+                      </a:r>
+                      <a:endParaRPr lang="es-PE" sz="800" b="0" i="0" u="none" strike="noStrike" cap="none" dirty="0" smtClean="0">
+                        <a:solidFill>
+                          <a:srgbClr val="FF0000"/>
+                        </a:solidFill>
+                        <a:latin typeface="Arial"/>
+                        <a:cs typeface="Arial"/>
+                        <a:sym typeface="Arial"/>
+                      </a:endParaRPr>
+                    </a:p>
+                    <a:p>
+                      <a:pPr marL="0" marR="0" lvl="0" indent="0" algn="l" defTabSz="914400" rtl="0" eaLnBrk="1" fontAlgn="auto" latinLnBrk="0" hangingPunct="1">
+                        <a:lnSpc>
+                          <a:spcPct val="100000"/>
+                        </a:lnSpc>
+                        <a:spcBef>
+                          <a:spcPts val="0"/>
+                        </a:spcBef>
+                        <a:spcAft>
+                          <a:spcPts val="0"/>
+                        </a:spcAft>
+                        <a:buClr>
+                          <a:srgbClr val="000000"/>
+                        </a:buClr>
+                        <a:buSzTx/>
+                        <a:buFont typeface="Arial" panose="020B0604020202020204" pitchFamily="34" charset="0"/>
+                        <a:buNone/>
+                        <a:tabLst/>
+                        <a:defRPr/>
+                      </a:pPr>
+                      <a:r>
+                        <a:rPr lang="es-PE" sz="800" b="0" i="0" u="none" strike="noStrike" cap="none" dirty="0" smtClean="0">
+                          <a:solidFill>
+                            <a:srgbClr val="FF0000"/>
                           </a:solidFill>
                           <a:latin typeface="Arial"/>
                           <a:cs typeface="Arial"/>
@@ -7748,17 +8415,17 @@
                       <a:r>
                         <a:rPr lang="es-PE" sz="800" b="0" i="0" u="none" strike="noStrike" cap="none" baseline="0" dirty="0" smtClean="0">
                           <a:solidFill>
-                            <a:srgbClr val="000000"/>
+                            <a:srgbClr val="FF0000"/>
                           </a:solidFill>
                           <a:latin typeface="Arial"/>
                           <a:cs typeface="Arial"/>
                           <a:sym typeface="Arial"/>
                         </a:rPr>
-                        <a:t> de Trabajo en Elaboración</a:t>
+                        <a:t> de Trabajo</a:t>
                       </a:r>
                       <a:endParaRPr lang="es-PE" sz="800" b="0" i="0" u="none" strike="noStrike" cap="none" dirty="0">
                         <a:solidFill>
-                          <a:srgbClr val="000000"/>
+                          <a:srgbClr val="FF0000"/>
                         </a:solidFill>
                         <a:latin typeface="Arial"/>
                         <a:cs typeface="Arial"/>
@@ -7773,7 +8440,7 @@
                     <a:bodyPr/>
                     <a:lstStyle/>
                     <a:p>
-                      <a:pPr marL="171450" marR="0" lvl="0" indent="-171450" algn="l" defTabSz="914400" rtl="0" eaLnBrk="1" fontAlgn="auto" latinLnBrk="0" hangingPunct="1">
+                      <a:pPr marL="0" marR="0" lvl="0" indent="0" algn="l" defTabSz="914400" rtl="0" eaLnBrk="1" fontAlgn="auto" latinLnBrk="0" hangingPunct="1">
                         <a:lnSpc>
                           <a:spcPct val="100000"/>
                         </a:lnSpc>
@@ -7788,21 +8455,15 @@
                         </a:buClr>
                         <a:buSzTx/>
                         <a:buFont typeface="Arial" panose="020B0604020202020204" pitchFamily="34" charset="0"/>
-                        <a:buChar char="•"/>
+                        <a:buNone/>
                         <a:tabLst/>
                         <a:defRPr/>
                       </a:pPr>
                       <a:r>
-                        <a:rPr lang="es-PE" sz="1100" b="0" u="none" strike="noStrike" dirty="0">
-                          <a:effectLst/>
-                        </a:rPr>
-                        <a:t> </a:t>
-                      </a:r>
-                      <a:r>
                         <a:rPr lang="es-PE" sz="1100" b="0" u="none" strike="noStrike" dirty="0" smtClean="0">
                           <a:effectLst/>
                         </a:rPr>
-                        <a:t>13 Distritos</a:t>
+                        <a:t>13 Distritos de las Provincias Andahuaylas</a:t>
                       </a:r>
                     </a:p>
                     <a:p>
@@ -7925,17 +8586,6 @@
                         </a:rPr>
                         <a:t>(Definir)</a:t>
                       </a:r>
-                      <a:endParaRPr lang="es-PE" sz="1100" b="0" kern="1200" dirty="0" smtClean="0">
-                        <a:solidFill>
-                          <a:schemeClr val="tx1">
-                            <a:lumMod val="95000"/>
-                            <a:lumOff val="5000"/>
-                          </a:schemeClr>
-                        </a:solidFill>
-                        <a:latin typeface="+mn-lt"/>
-                        <a:ea typeface="+mn-ea"/>
-                        <a:cs typeface="+mn-cs"/>
-                      </a:endParaRPr>
                     </a:p>
                   </a:txBody>
                   <a:tcPr marL="121920" marR="121920" marT="60960" marB="60960"/>
@@ -7986,7 +8636,50 @@
                       </a:endParaRPr>
                     </a:p>
                   </a:txBody>
-                  <a:tcPr marL="121920" marR="121920" marT="60960" marB="60960"/>
+                  <a:tcPr marL="121920" marR="121920" marT="60960" marB="60960" anchor="ctr"/>
+                </a:tc>
+                <a:tc>
+                  <a:txBody>
+                    <a:bodyPr/>
+                    <a:lstStyle/>
+                    <a:p>
+                      <a:pPr marR="0" algn="ctr" rtl="0">
+                        <a:lnSpc>
+                          <a:spcPct val="100000"/>
+                        </a:lnSpc>
+                        <a:spcBef>
+                          <a:spcPts val="0"/>
+                        </a:spcBef>
+                        <a:spcAft>
+                          <a:spcPts val="0"/>
+                        </a:spcAft>
+                        <a:buClr>
+                          <a:srgbClr val="000000"/>
+                        </a:buClr>
+                        <a:buFont typeface="Arial"/>
+                      </a:pPr>
+                      <a:r>
+                        <a:rPr lang="es-PE" sz="1100" b="0" i="0" u="none" strike="noStrike" cap="none" dirty="0" smtClean="0">
+                          <a:solidFill>
+                            <a:srgbClr val="000000"/>
+                          </a:solidFill>
+                          <a:latin typeface="Arial"/>
+                          <a:cs typeface="Arial"/>
+                          <a:sym typeface="Arial"/>
+                        </a:rPr>
+                        <a:t>107122</a:t>
+                      </a:r>
+                      <a:endParaRPr lang="es-PE" sz="1100" b="0" i="0" u="none" strike="noStrike" cap="none" dirty="0">
+                        <a:solidFill>
+                          <a:srgbClr val="000000"/>
+                        </a:solidFill>
+                        <a:latin typeface="Arial"/>
+                        <a:cs typeface="Arial"/>
+                        <a:sym typeface="Arial"/>
+                      </a:endParaRPr>
+                    </a:p>
+                  </a:txBody>
+                  <a:tcPr marL="121920" marR="121920" marT="60960" marB="60960" anchor="ctr"/>
                 </a:tc>
                 <a:tc>
                   <a:txBody>
@@ -8019,7 +8712,7 @@
                     <a:bodyPr/>
                     <a:lstStyle/>
                     <a:p>
-                      <a:pPr marL="171450" marR="0" lvl="0" indent="-171450" algn="l" defTabSz="914400" rtl="0" eaLnBrk="1" fontAlgn="auto" latinLnBrk="0" hangingPunct="1">
+                      <a:pPr marL="0" marR="0" lvl="0" indent="0" algn="l" defTabSz="914400" rtl="0" eaLnBrk="1" fontAlgn="auto" latinLnBrk="0" hangingPunct="1">
                         <a:lnSpc>
                           <a:spcPct val="100000"/>
                         </a:lnSpc>
@@ -8034,7 +8727,7 @@
                         </a:buClr>
                         <a:buSzTx/>
                         <a:buFont typeface="Arial" panose="020B0604020202020204" pitchFamily="34" charset="0"/>
-                        <a:buChar char="•"/>
+                        <a:buNone/>
                         <a:tabLst/>
                         <a:defRPr/>
                       </a:pPr>
@@ -8092,7 +8785,7 @@
                     <a:bodyPr/>
                     <a:lstStyle/>
                     <a:p>
-                      <a:pPr marL="171450" marR="0" lvl="0" indent="-171450" algn="l" defTabSz="914400" rtl="0" eaLnBrk="1" fontAlgn="auto" latinLnBrk="0" hangingPunct="1">
+                      <a:pPr marL="0" marR="0" lvl="0" indent="0" algn="l" defTabSz="914400" rtl="0" eaLnBrk="1" fontAlgn="auto" latinLnBrk="0" hangingPunct="1">
                         <a:lnSpc>
                           <a:spcPct val="100000"/>
                         </a:lnSpc>
@@ -8107,22 +8800,91 @@
                         </a:buClr>
                         <a:buSzTx/>
                         <a:buFont typeface="Arial" panose="020B0604020202020204" pitchFamily="34" charset="0"/>
-                        <a:buChar char="•"/>
+                        <a:buNone/>
                         <a:tabLst/>
                         <a:defRPr/>
                       </a:pPr>
                       <a:r>
-                        <a:rPr lang="es-PE" sz="800" b="0" i="0" u="none" strike="noStrike" kern="1200" cap="none" dirty="0" smtClean="0">
+                        <a:rPr lang="es-PE" sz="800" b="0" i="0" u="none" strike="noStrike" cap="none" dirty="0" smtClean="0">
                           <a:solidFill>
-                            <a:srgbClr val="000000"/>
+                            <a:srgbClr val="FF0000"/>
                           </a:solidFill>
                           <a:latin typeface="Arial"/>
-                          <a:ea typeface="+mn-ea"/>
                           <a:cs typeface="Arial"/>
                           <a:sym typeface="Arial"/>
                         </a:rPr>
-                        <a:t>Plan de Trabajo en Elaboración</a:t>
+                        <a:t>No</a:t>
                       </a:r>
+                      <a:r>
+                        <a:rPr lang="es-PE" sz="800" b="0" i="0" u="none" strike="noStrike" cap="none" baseline="0" dirty="0" smtClean="0">
+                          <a:solidFill>
+                            <a:srgbClr val="FF0000"/>
+                          </a:solidFill>
+                          <a:latin typeface="Arial"/>
+                          <a:cs typeface="Arial"/>
+                          <a:sym typeface="Arial"/>
+                        </a:rPr>
+                        <a:t> cuenta con</a:t>
+                      </a:r>
+                      <a:endParaRPr lang="es-PE" sz="800" b="0" i="0" u="none" strike="noStrike" cap="none" dirty="0" smtClean="0">
+                        <a:solidFill>
+                          <a:srgbClr val="FF0000"/>
+                        </a:solidFill>
+                        <a:latin typeface="Arial"/>
+                        <a:cs typeface="Arial"/>
+                        <a:sym typeface="Arial"/>
+                      </a:endParaRPr>
+                    </a:p>
+                    <a:p>
+                      <a:pPr marL="0" marR="0" lvl="0" indent="0" algn="l" defTabSz="914400" rtl="0" eaLnBrk="1" fontAlgn="auto" latinLnBrk="0" hangingPunct="1">
+                        <a:lnSpc>
+                          <a:spcPct val="100000"/>
+                        </a:lnSpc>
+                        <a:spcBef>
+                          <a:spcPts val="0"/>
+                        </a:spcBef>
+                        <a:spcAft>
+                          <a:spcPts val="0"/>
+                        </a:spcAft>
+                        <a:buClr>
+                          <a:srgbClr val="000000"/>
+                        </a:buClr>
+                        <a:buSzTx/>
+                        <a:buFont typeface="Arial" panose="020B0604020202020204" pitchFamily="34" charset="0"/>
+                        <a:buNone/>
+                        <a:tabLst/>
+                        <a:defRPr/>
+                      </a:pPr>
+                      <a:r>
+                        <a:rPr lang="es-PE" sz="800" b="0" i="0" u="none" strike="noStrike" cap="none" dirty="0" smtClean="0">
+                          <a:solidFill>
+                            <a:srgbClr val="FF0000"/>
+                          </a:solidFill>
+                          <a:latin typeface="Arial"/>
+                          <a:cs typeface="Arial"/>
+                          <a:sym typeface="Arial"/>
+                        </a:rPr>
+                        <a:t>Plan</a:t>
+                      </a:r>
+                      <a:r>
+                        <a:rPr lang="es-PE" sz="800" b="0" i="0" u="none" strike="noStrike" cap="none" baseline="0" dirty="0" smtClean="0">
+                          <a:solidFill>
+                            <a:srgbClr val="FF0000"/>
+                          </a:solidFill>
+                          <a:latin typeface="Arial"/>
+                          <a:cs typeface="Arial"/>
+                          <a:sym typeface="Arial"/>
+                        </a:rPr>
+                        <a:t> de Trabajo</a:t>
+                      </a:r>
+                      <a:endParaRPr lang="es-PE" sz="800" b="0" i="0" u="none" strike="noStrike" cap="none" dirty="0" smtClean="0">
+                        <a:solidFill>
+                          <a:srgbClr val="FF0000"/>
+                        </a:solidFill>
+                        <a:latin typeface="Arial"/>
+                        <a:cs typeface="Arial"/>
+                        <a:sym typeface="Arial"/>
+                      </a:endParaRPr>
                     </a:p>
                     <a:p>
                       <a:pPr marL="171450" marR="0" lvl="0" indent="-171450" algn="l" defTabSz="914400" rtl="0" eaLnBrk="1" fontAlgn="auto" latinLnBrk="0" hangingPunct="1">
@@ -8146,7 +8908,7 @@
                       </a:pPr>
                       <a:endParaRPr lang="es-PE" sz="800" b="0" i="0" u="none" strike="noStrike" kern="1200" cap="none" dirty="0">
                         <a:solidFill>
-                          <a:srgbClr val="000000"/>
+                          <a:srgbClr val="FF0000"/>
                         </a:solidFill>
                         <a:latin typeface="Arial"/>
                         <a:ea typeface="+mn-ea"/>
@@ -8162,9 +8924,22 @@
                     <a:bodyPr/>
                     <a:lstStyle/>
                     <a:p>
-                      <a:pPr marL="171450" indent="-171450">
+                      <a:pPr marL="0" marR="0" lvl="0" indent="0" algn="l" defTabSz="914400" rtl="0" eaLnBrk="1" fontAlgn="auto" latinLnBrk="0" hangingPunct="1">
+                        <a:lnSpc>
+                          <a:spcPct val="100000"/>
+                        </a:lnSpc>
+                        <a:spcBef>
+                          <a:spcPts val="0"/>
+                        </a:spcBef>
+                        <a:spcAft>
+                          <a:spcPts val="0"/>
+                        </a:spcAft>
+                        <a:buClrTx/>
+                        <a:buSzTx/>
                         <a:buFont typeface="Arial" panose="020B0604020202020204" pitchFamily="34" charset="0"/>
-                        <a:buChar char="•"/>
+                        <a:buNone/>
+                        <a:tabLst/>
+                        <a:defRPr/>
                       </a:pPr>
                       <a:r>
                         <a:rPr lang="es-PE" sz="1100" b="0" u="none" strike="noStrike" cap="none" dirty="0" smtClean="0">
@@ -8173,8 +8948,20 @@
                           </a:solidFill>
                           <a:sym typeface="Arial"/>
                         </a:rPr>
-                        <a:t>11 Distritos</a:t>
+                        <a:t>11 Distritos </a:t>
                       </a:r>
+                      <a:r>
+                        <a:rPr lang="es-PE" sz="1100" b="0" u="none" strike="noStrike" dirty="0" smtClean="0">
+                          <a:effectLst/>
+                        </a:rPr>
+                        <a:t>de las Provincias Chincheros</a:t>
+                      </a:r>
+                    </a:p>
+                    <a:p>
+                      <a:pPr marL="171450" indent="-171450">
+                        <a:buFont typeface="Arial" panose="020B0604020202020204" pitchFamily="34" charset="0"/>
+                        <a:buChar char="•"/>
+                      </a:pPr>
                       <a:endParaRPr lang="es-PE" sz="1100" b="0" u="none" strike="noStrike" cap="none" dirty="0">
                         <a:solidFill>
                           <a:srgbClr val="000000"/>
@@ -8273,17 +9060,6 @@
                         </a:rPr>
                         <a:t>(Definir)</a:t>
                       </a:r>
-                      <a:endParaRPr lang="es-PE" sz="1100" b="0" kern="1200" dirty="0" smtClean="0">
-                        <a:solidFill>
-                          <a:schemeClr val="tx1">
-                            <a:lumMod val="95000"/>
-                            <a:lumOff val="5000"/>
-                          </a:schemeClr>
-                        </a:solidFill>
-                        <a:latin typeface="+mn-lt"/>
-                        <a:ea typeface="+mn-ea"/>
-                        <a:cs typeface="+mn-cs"/>
-                      </a:endParaRPr>
                     </a:p>
                   </a:txBody>
                   <a:tcPr marL="121920" marR="121920" marT="60960" marB="60960"/>
@@ -8334,7 +9110,50 @@
                       </a:endParaRPr>
                     </a:p>
                   </a:txBody>
-                  <a:tcPr marL="121920" marR="121920" marT="60960" marB="60960"/>
+                  <a:tcPr marL="121920" marR="121920" marT="60960" marB="60960" anchor="ctr"/>
+                </a:tc>
+                <a:tc>
+                  <a:txBody>
+                    <a:bodyPr/>
+                    <a:lstStyle/>
+                    <a:p>
+                      <a:pPr marR="0" algn="ctr" rtl="0">
+                        <a:lnSpc>
+                          <a:spcPct val="100000"/>
+                        </a:lnSpc>
+                        <a:spcBef>
+                          <a:spcPts val="0"/>
+                        </a:spcBef>
+                        <a:spcAft>
+                          <a:spcPts val="0"/>
+                        </a:spcAft>
+                        <a:buClr>
+                          <a:srgbClr val="000000"/>
+                        </a:buClr>
+                        <a:buFont typeface="Arial"/>
+                      </a:pPr>
+                      <a:r>
+                        <a:rPr lang="es-PE" sz="1100" b="0" i="0" u="none" strike="noStrike" cap="none" dirty="0" smtClean="0">
+                          <a:solidFill>
+                            <a:srgbClr val="000000"/>
+                          </a:solidFill>
+                          <a:latin typeface="Arial"/>
+                          <a:cs typeface="Arial"/>
+                          <a:sym typeface="Arial"/>
+                        </a:rPr>
+                        <a:t>107115</a:t>
+                      </a:r>
+                      <a:endParaRPr lang="es-PE" sz="1100" b="0" i="0" u="none" strike="noStrike" cap="none" dirty="0">
+                        <a:solidFill>
+                          <a:srgbClr val="000000"/>
+                        </a:solidFill>
+                        <a:latin typeface="Arial"/>
+                        <a:cs typeface="Arial"/>
+                        <a:sym typeface="Arial"/>
+                      </a:endParaRPr>
+                    </a:p>
+                  </a:txBody>
+                  <a:tcPr marL="121920" marR="121920" marT="60960" marB="60960" anchor="ctr"/>
                 </a:tc>
                 <a:tc>
                   <a:txBody>
@@ -8348,7 +9167,7 @@
                           </a:solidFill>
                           <a:sym typeface="Arial"/>
                         </a:rPr>
-                        <a:t>RECUPERACION DE  ECOSISTEMA DE  PAJONAL DE PUNA HUMEDA, BOFEDAL Y MATORRAL ANDINO EN LA UNIDAD HIDROGRAFICA DE LOS RIOS PACHACHACA MEDIO Y SILCON DE 15 DISTRITOS DE  LAS PROVINCIAS DE ABANCAY Y AYMARAES Y ANDAHUAYLAS DE  LA REGION DE APURIMAC</a:t>
+                        <a:t>RECUPERACION DE  ECOSISTEMA DE  PAJONAL DE PUNA HUMEDA, BOFEDAL Y MATORRAL ANDINO EN LA UNIDAD HIDROGRAFICA DE LOS RIOS PACHACHACA MEDIO Y SILCON DE 15 DISTRITOS DE  LAS PROVINCIAS DE ABANCAY, AYMARAES Y ANDAHUAYLAS DE  LA REGION DE APURIMAC</a:t>
                       </a:r>
                       <a:endParaRPr lang="es-PE" sz="1100" b="0" i="0" u="none" strike="noStrike" cap="none" dirty="0">
                         <a:solidFill>
@@ -8367,7 +9186,7 @@
                     <a:bodyPr/>
                     <a:lstStyle/>
                     <a:p>
-                      <a:pPr marL="171450" marR="0" lvl="0" indent="-171450" algn="l" defTabSz="914400" rtl="0" eaLnBrk="1" fontAlgn="auto" latinLnBrk="0" hangingPunct="1">
+                      <a:pPr marL="0" marR="0" lvl="0" indent="0" algn="l" defTabSz="914400" rtl="0" eaLnBrk="1" fontAlgn="auto" latinLnBrk="0" hangingPunct="1">
                         <a:lnSpc>
                           <a:spcPct val="100000"/>
                         </a:lnSpc>
@@ -8382,7 +9201,7 @@
                         </a:buClr>
                         <a:buSzTx/>
                         <a:buFont typeface="Arial" panose="020B0604020202020204" pitchFamily="34" charset="0"/>
-                        <a:buChar char="•"/>
+                        <a:buNone/>
                         <a:tabLst/>
                         <a:defRPr/>
                       </a:pPr>
@@ -8442,6 +9261,188 @@
                     <a:bodyPr/>
                     <a:lstStyle/>
                     <a:p>
+                      <a:pPr marL="0" marR="0" lvl="0" indent="0" algn="l" defTabSz="914400" rtl="0" eaLnBrk="1" fontAlgn="auto" latinLnBrk="0" hangingPunct="1">
+                        <a:lnSpc>
+                          <a:spcPct val="100000"/>
+                        </a:lnSpc>
+                        <a:spcBef>
+                          <a:spcPts val="0"/>
+                        </a:spcBef>
+                        <a:spcAft>
+                          <a:spcPts val="0"/>
+                        </a:spcAft>
+                        <a:buClr>
+                          <a:srgbClr val="000000"/>
+                        </a:buClr>
+                        <a:buSzTx/>
+                        <a:buFont typeface="Arial" panose="020B0604020202020204" pitchFamily="34" charset="0"/>
+                        <a:buNone/>
+                        <a:tabLst/>
+                        <a:defRPr/>
+                      </a:pPr>
+                      <a:r>
+                        <a:rPr lang="es-PE" sz="800" b="0" i="0" u="none" strike="noStrike" cap="none" dirty="0" smtClean="0">
+                          <a:solidFill>
+                            <a:srgbClr val="FF0000"/>
+                          </a:solidFill>
+                          <a:latin typeface="Arial"/>
+                          <a:cs typeface="Arial"/>
+                          <a:sym typeface="Arial"/>
+                        </a:rPr>
+                        <a:t>No</a:t>
+                      </a:r>
+                      <a:r>
+                        <a:rPr lang="es-PE" sz="800" b="0" i="0" u="none" strike="noStrike" cap="none" baseline="0" dirty="0" smtClean="0">
+                          <a:solidFill>
+                            <a:srgbClr val="FF0000"/>
+                          </a:solidFill>
+                          <a:latin typeface="Arial"/>
+                          <a:cs typeface="Arial"/>
+                          <a:sym typeface="Arial"/>
+                        </a:rPr>
+                        <a:t> cuenta con</a:t>
+                      </a:r>
+                      <a:endParaRPr lang="es-PE" sz="800" b="0" i="0" u="none" strike="noStrike" cap="none" dirty="0" smtClean="0">
+                        <a:solidFill>
+                          <a:srgbClr val="FF0000"/>
+                        </a:solidFill>
+                        <a:latin typeface="Arial"/>
+                        <a:cs typeface="Arial"/>
+                        <a:sym typeface="Arial"/>
+                      </a:endParaRPr>
+                    </a:p>
+                    <a:p>
+                      <a:pPr marL="0" marR="0" lvl="0" indent="0" algn="l" defTabSz="914400" rtl="0" eaLnBrk="1" fontAlgn="auto" latinLnBrk="0" hangingPunct="1">
+                        <a:lnSpc>
+                          <a:spcPct val="100000"/>
+                        </a:lnSpc>
+                        <a:spcBef>
+                          <a:spcPts val="0"/>
+                        </a:spcBef>
+                        <a:spcAft>
+                          <a:spcPts val="0"/>
+                        </a:spcAft>
+                        <a:buClr>
+                          <a:srgbClr val="000000"/>
+                        </a:buClr>
+                        <a:buSzTx/>
+                        <a:buFont typeface="Arial" panose="020B0604020202020204" pitchFamily="34" charset="0"/>
+                        <a:buNone/>
+                        <a:tabLst/>
+                        <a:defRPr/>
+                      </a:pPr>
+                      <a:r>
+                        <a:rPr lang="es-PE" sz="800" b="0" i="0" u="none" strike="noStrike" cap="none" dirty="0" smtClean="0">
+                          <a:solidFill>
+                            <a:srgbClr val="FF0000"/>
+                          </a:solidFill>
+                          <a:latin typeface="Arial"/>
+                          <a:cs typeface="Arial"/>
+                          <a:sym typeface="Arial"/>
+                        </a:rPr>
+                        <a:t>Plan</a:t>
+                      </a:r>
+                      <a:r>
+                        <a:rPr lang="es-PE" sz="800" b="0" i="0" u="none" strike="noStrike" cap="none" baseline="0" dirty="0" smtClean="0">
+                          <a:solidFill>
+                            <a:srgbClr val="FF0000"/>
+                          </a:solidFill>
+                          <a:latin typeface="Arial"/>
+                          <a:cs typeface="Arial"/>
+                          <a:sym typeface="Arial"/>
+                        </a:rPr>
+                        <a:t> de Trabajo</a:t>
+                      </a:r>
+                      <a:endParaRPr lang="es-PE" sz="800" b="0" i="0" u="none" strike="noStrike" cap="none" dirty="0" smtClean="0">
+                        <a:solidFill>
+                          <a:srgbClr val="FF0000"/>
+                        </a:solidFill>
+                        <a:latin typeface="Arial"/>
+                        <a:cs typeface="Arial"/>
+                        <a:sym typeface="Arial"/>
+                      </a:endParaRPr>
+                    </a:p>
+                    <a:p>
+                      <a:pPr marL="0" marR="0" lvl="0" indent="0" algn="l" defTabSz="914400" rtl="0" eaLnBrk="1" fontAlgn="auto" latinLnBrk="0" hangingPunct="1">
+                        <a:lnSpc>
+                          <a:spcPct val="100000"/>
+                        </a:lnSpc>
+                        <a:spcBef>
+                          <a:spcPts val="0"/>
+                        </a:spcBef>
+                        <a:spcAft>
+                          <a:spcPts val="0"/>
+                        </a:spcAft>
+                        <a:buClr>
+                          <a:srgbClr val="000000"/>
+                        </a:buClr>
+                        <a:buSzTx/>
+                        <a:buFont typeface="Arial" panose="020B0604020202020204" pitchFamily="34" charset="0"/>
+                        <a:buNone/>
+                        <a:tabLst/>
+                        <a:defRPr/>
+                      </a:pPr>
+                      <a:endParaRPr lang="es-PE" sz="800" b="0" i="0" u="none" strike="noStrike" kern="1200" cap="none" dirty="0">
+                        <a:solidFill>
+                          <a:srgbClr val="FF0000"/>
+                        </a:solidFill>
+                        <a:latin typeface="Arial"/>
+                        <a:ea typeface="+mn-ea"/>
+                        <a:cs typeface="Arial"/>
+                        <a:sym typeface="Arial"/>
+                      </a:endParaRPr>
+                    </a:p>
+                  </a:txBody>
+                  <a:tcPr marL="121920" marR="121920" marT="60960" marB="60960"/>
+                </a:tc>
+                <a:tc>
+                  <a:txBody>
+                    <a:bodyPr/>
+                    <a:lstStyle/>
+                    <a:p>
+                      <a:pPr marL="0" marR="0" lvl="0" indent="0" algn="l" defTabSz="914400" rtl="0" eaLnBrk="1" fontAlgn="auto" latinLnBrk="0" hangingPunct="1">
+                        <a:lnSpc>
+                          <a:spcPct val="100000"/>
+                        </a:lnSpc>
+                        <a:spcBef>
+                          <a:spcPts val="0"/>
+                        </a:spcBef>
+                        <a:spcAft>
+                          <a:spcPts val="0"/>
+                        </a:spcAft>
+                        <a:buClr>
+                          <a:srgbClr val="000000"/>
+                        </a:buClr>
+                        <a:buSzTx/>
+                        <a:buFont typeface="Arial" panose="020B0604020202020204" pitchFamily="34" charset="0"/>
+                        <a:buNone/>
+                        <a:tabLst/>
+                        <a:defRPr/>
+                      </a:pPr>
+                      <a:r>
+                        <a:rPr lang="es-PE" sz="1100" b="0" dirty="0" smtClean="0"/>
+                        <a:t>15 Distritos </a:t>
+                      </a:r>
+                      <a:r>
+                        <a:rPr lang="es-PE" sz="1100" b="0" u="none" strike="noStrike" dirty="0" smtClean="0">
+                          <a:effectLst/>
+                        </a:rPr>
+                        <a:t>de las Provincias Abancay,Aymaraes</a:t>
+                      </a:r>
+                      <a:r>
+                        <a:rPr lang="es-PE" sz="1100" b="0" u="none" strike="noStrike" baseline="0" dirty="0" smtClean="0">
+                          <a:effectLst/>
+                        </a:rPr>
+                        <a:t> y </a:t>
+                      </a:r>
+                      <a:r>
+                        <a:rPr lang="es-PE" sz="1100" b="0" u="none" strike="noStrike" dirty="0" smtClean="0">
+                          <a:effectLst/>
+                        </a:rPr>
+                        <a:t>Andahuaylas</a:t>
+                      </a:r>
+                    </a:p>
+                    <a:p>
                       <a:pPr marL="171450" marR="0" lvl="0" indent="-171450" algn="l" defTabSz="914400" rtl="0" eaLnBrk="1" fontAlgn="auto" latinLnBrk="0" hangingPunct="1">
                         <a:lnSpc>
                           <a:spcPct val="100000"/>
@@ -8461,80 +9462,6 @@
                         <a:tabLst/>
                         <a:defRPr/>
                       </a:pPr>
-                      <a:r>
-                        <a:rPr lang="es-PE" sz="800" b="0" i="0" u="none" strike="noStrike" kern="1200" cap="none" dirty="0" smtClean="0">
-                          <a:solidFill>
-                            <a:srgbClr val="000000"/>
-                          </a:solidFill>
-                          <a:latin typeface="Arial"/>
-                          <a:ea typeface="+mn-ea"/>
-                          <a:cs typeface="Arial"/>
-                          <a:sym typeface="Arial"/>
-                        </a:rPr>
-                        <a:t>Plan de Trabajo en Elaboración</a:t>
-                      </a:r>
-                    </a:p>
-                    <a:p>
-                      <a:pPr marL="171450" marR="0" lvl="0" indent="-171450" algn="l" defTabSz="914400" rtl="0" eaLnBrk="1" fontAlgn="auto" latinLnBrk="0" hangingPunct="1">
-                        <a:lnSpc>
-                          <a:spcPct val="100000"/>
-                        </a:lnSpc>
-                        <a:spcBef>
-                          <a:spcPts val="0"/>
-                        </a:spcBef>
-                        <a:spcAft>
-                          <a:spcPts val="0"/>
-                        </a:spcAft>
-                        <a:buClr>
-                          <a:srgbClr val="000000"/>
-                        </a:buClr>
-                        <a:buSzTx/>
-                        <a:buFont typeface="Arial" panose="020B0604020202020204" pitchFamily="34" charset="0"/>
-                        <a:buChar char="•"/>
-                        <a:tabLst/>
-                        <a:defRPr/>
-                      </a:pPr>
-                      <a:endParaRPr lang="es-PE" sz="800" b="0" i="0" u="none" strike="noStrike" kern="1200" cap="none" dirty="0">
-                        <a:solidFill>
-                          <a:srgbClr val="000000"/>
-                        </a:solidFill>
-                        <a:latin typeface="Arial"/>
-                        <a:ea typeface="+mn-ea"/>
-                        <a:cs typeface="Arial"/>
-                        <a:sym typeface="Arial"/>
-                      </a:endParaRPr>
-                    </a:p>
-                  </a:txBody>
-                  <a:tcPr marL="121920" marR="121920" marT="60960" marB="60960"/>
-                </a:tc>
-                <a:tc>
-                  <a:txBody>
-                    <a:bodyPr/>
-                    <a:lstStyle/>
-                    <a:p>
-                      <a:pPr marL="171450" marR="0" lvl="0" indent="-171450" algn="l" defTabSz="914400" rtl="0" eaLnBrk="1" fontAlgn="auto" latinLnBrk="0" hangingPunct="1">
-                        <a:lnSpc>
-                          <a:spcPct val="100000"/>
-                        </a:lnSpc>
-                        <a:spcBef>
-                          <a:spcPts val="0"/>
-                        </a:spcBef>
-                        <a:spcAft>
-                          <a:spcPts val="0"/>
-                        </a:spcAft>
-                        <a:buClr>
-                          <a:srgbClr val="000000"/>
-                        </a:buClr>
-                        <a:buSzTx/>
-                        <a:buFont typeface="Arial" panose="020B0604020202020204" pitchFamily="34" charset="0"/>
-                        <a:buChar char="•"/>
-                        <a:tabLst/>
-                        <a:defRPr/>
-                      </a:pPr>
-                      <a:r>
-                        <a:rPr lang="es-PE" sz="1100" b="0" dirty="0" smtClean="0"/>
-                        <a:t>15 Distritos</a:t>
-                      </a:r>
                       <a:endParaRPr lang="es-PE" sz="1100" b="0" dirty="0"/>
                     </a:p>
                   </a:txBody>
@@ -8628,17 +9555,6 @@
                         </a:rPr>
                         <a:t>(Definir)</a:t>
                       </a:r>
-                      <a:endParaRPr lang="es-PE" sz="1100" b="0" kern="1200" dirty="0" smtClean="0">
-                        <a:solidFill>
-                          <a:schemeClr val="tx1">
-                            <a:lumMod val="95000"/>
-                            <a:lumOff val="5000"/>
-                          </a:schemeClr>
-                        </a:solidFill>
-                        <a:latin typeface="+mn-lt"/>
-                        <a:ea typeface="+mn-ea"/>
-                        <a:cs typeface="+mn-cs"/>
-                      </a:endParaRPr>
                     </a:p>
                   </a:txBody>
                   <a:tcPr marL="121920" marR="121920" marT="60960" marB="60960"/>
@@ -8653,6 +9569,310 @@
           </a:graphicData>
         </a:graphic>
       </p:graphicFrame>
+      <p:sp>
+        <p:nvSpPr>
+          <p:cNvPr id="5" name="Google Shape;95;p13">
+            <a:extLst>
+              <a:ext uri="{FF2B5EF4-FFF2-40B4-BE49-F238E27FC236}">
+                <a16:creationId xmlns:a16="http://schemas.microsoft.com/office/drawing/2014/main" id="{7DB9BA98-6BEB-4F68-8F37-ADE0EF83B1E6}"/>
+              </a:ext>
+            </a:extLst>
+          </p:cNvPr>
+          <p:cNvSpPr txBox="1">
+            <a:spLocks/>
+          </p:cNvSpPr>
+          <p:nvPr/>
+        </p:nvSpPr>
+        <p:spPr>
+          <a:xfrm>
+            <a:off x="471761" y="1174871"/>
+            <a:ext cx="10562741" cy="602007"/>
+          </a:xfrm>
+          <a:prstGeom prst="rect">
+            <a:avLst/>
+          </a:prstGeom>
+          <a:noFill/>
+          <a:ln>
+            <a:noFill/>
+          </a:ln>
+        </p:spPr>
+        <p:txBody>
+          <a:bodyPr spcFirstLastPara="1" wrap="square" lIns="0" tIns="0" rIns="0" bIns="0" anchor="b" anchorCtr="0">
+            <a:noAutofit/>
+          </a:bodyPr>
+          <a:lstStyle>
+            <a:defPPr marR="0" lvl="0" algn="l" rtl="0">
+              <a:lnSpc>
+                <a:spcPct val="100000"/>
+              </a:lnSpc>
+              <a:spcBef>
+                <a:spcPts val="0"/>
+              </a:spcBef>
+              <a:spcAft>
+                <a:spcPts val="0"/>
+              </a:spcAft>
+            </a:defPPr>
+            <a:lvl1pPr marR="0" lvl="0" algn="l" rtl="0">
+              <a:lnSpc>
+                <a:spcPct val="100000"/>
+              </a:lnSpc>
+              <a:spcBef>
+                <a:spcPts val="0"/>
+              </a:spcBef>
+              <a:spcAft>
+                <a:spcPts val="0"/>
+              </a:spcAft>
+              <a:buClr>
+                <a:schemeClr val="dk1"/>
+              </a:buClr>
+              <a:buSzPts val="5400"/>
+              <a:buFont typeface="Lato Black"/>
+              <a:buNone/>
+              <a:defRPr sz="5400" b="0" i="0" u="none" strike="noStrike" cap="none">
+                <a:solidFill>
+                  <a:schemeClr val="dk1"/>
+                </a:solidFill>
+                <a:latin typeface="Lato Black"/>
+                <a:ea typeface="Lato Black"/>
+                <a:cs typeface="Lato Black"/>
+                <a:sym typeface="Lato Black"/>
+              </a:defRPr>
+            </a:lvl1pPr>
+            <a:lvl2pPr marR="0" lvl="1" algn="l" rtl="0">
+              <a:lnSpc>
+                <a:spcPct val="100000"/>
+              </a:lnSpc>
+              <a:spcBef>
+                <a:spcPts val="0"/>
+              </a:spcBef>
+              <a:spcAft>
+                <a:spcPts val="0"/>
+              </a:spcAft>
+              <a:buClr>
+                <a:schemeClr val="dk1"/>
+              </a:buClr>
+              <a:buSzPts val="5400"/>
+              <a:buFont typeface="Lato Black"/>
+              <a:buNone/>
+              <a:defRPr sz="5400" b="0" i="0" u="none" strike="noStrike" cap="none">
+                <a:solidFill>
+                  <a:schemeClr val="dk1"/>
+                </a:solidFill>
+                <a:latin typeface="Lato Black"/>
+                <a:ea typeface="Lato Black"/>
+                <a:cs typeface="Lato Black"/>
+                <a:sym typeface="Lato Black"/>
+              </a:defRPr>
+            </a:lvl2pPr>
+            <a:lvl3pPr marR="0" lvl="2" algn="l" rtl="0">
+              <a:lnSpc>
+                <a:spcPct val="100000"/>
+              </a:lnSpc>
+              <a:spcBef>
+                <a:spcPts val="0"/>
+              </a:spcBef>
+              <a:spcAft>
+                <a:spcPts val="0"/>
+              </a:spcAft>
+              <a:buClr>
+                <a:schemeClr val="dk1"/>
+              </a:buClr>
+              <a:buSzPts val="5400"/>
+              <a:buFont typeface="Lato Black"/>
+              <a:buNone/>
+              <a:defRPr sz="5400" b="0" i="0" u="none" strike="noStrike" cap="none">
+                <a:solidFill>
+                  <a:schemeClr val="dk1"/>
+                </a:solidFill>
+                <a:latin typeface="Lato Black"/>
+                <a:ea typeface="Lato Black"/>
+                <a:cs typeface="Lato Black"/>
+                <a:sym typeface="Lato Black"/>
+              </a:defRPr>
+            </a:lvl3pPr>
+            <a:lvl4pPr marR="0" lvl="3" algn="l" rtl="0">
+              <a:lnSpc>
+                <a:spcPct val="100000"/>
+              </a:lnSpc>
+              <a:spcBef>
+                <a:spcPts val="0"/>
+              </a:spcBef>
+              <a:spcAft>
+                <a:spcPts val="0"/>
+              </a:spcAft>
+              <a:buClr>
+                <a:schemeClr val="dk1"/>
+              </a:buClr>
+              <a:buSzPts val="5400"/>
+              <a:buFont typeface="Lato Black"/>
+              <a:buNone/>
+              <a:defRPr sz="5400" b="0" i="0" u="none" strike="noStrike" cap="none">
+                <a:solidFill>
+                  <a:schemeClr val="dk1"/>
+                </a:solidFill>
+                <a:latin typeface="Lato Black"/>
+                <a:ea typeface="Lato Black"/>
+                <a:cs typeface="Lato Black"/>
+                <a:sym typeface="Lato Black"/>
+              </a:defRPr>
+            </a:lvl4pPr>
+            <a:lvl5pPr marR="0" lvl="4" algn="l" rtl="0">
+              <a:lnSpc>
+                <a:spcPct val="100000"/>
+              </a:lnSpc>
+              <a:spcBef>
+                <a:spcPts val="0"/>
+              </a:spcBef>
+              <a:spcAft>
+                <a:spcPts val="0"/>
+              </a:spcAft>
+              <a:buClr>
+                <a:schemeClr val="dk1"/>
+              </a:buClr>
+              <a:buSzPts val="5400"/>
+              <a:buFont typeface="Lato Black"/>
+              <a:buNone/>
+              <a:defRPr sz="5400" b="0" i="0" u="none" strike="noStrike" cap="none">
+                <a:solidFill>
+                  <a:schemeClr val="dk1"/>
+                </a:solidFill>
+                <a:latin typeface="Lato Black"/>
+                <a:ea typeface="Lato Black"/>
+                <a:cs typeface="Lato Black"/>
+                <a:sym typeface="Lato Black"/>
+              </a:defRPr>
+            </a:lvl5pPr>
+            <a:lvl6pPr marR="0" lvl="5" algn="l" rtl="0">
+              <a:lnSpc>
+                <a:spcPct val="100000"/>
+              </a:lnSpc>
+              <a:spcBef>
+                <a:spcPts val="0"/>
+              </a:spcBef>
+              <a:spcAft>
+                <a:spcPts val="0"/>
+              </a:spcAft>
+              <a:buClr>
+                <a:schemeClr val="dk1"/>
+              </a:buClr>
+              <a:buSzPts val="5400"/>
+              <a:buFont typeface="Lato Black"/>
+              <a:buNone/>
+              <a:defRPr sz="5400" b="0" i="0" u="none" strike="noStrike" cap="none">
+                <a:solidFill>
+                  <a:schemeClr val="dk1"/>
+                </a:solidFill>
+                <a:latin typeface="Lato Black"/>
+                <a:ea typeface="Lato Black"/>
+                <a:cs typeface="Lato Black"/>
+                <a:sym typeface="Lato Black"/>
+              </a:defRPr>
+            </a:lvl6pPr>
+            <a:lvl7pPr marR="0" lvl="6" algn="l" rtl="0">
+              <a:lnSpc>
+                <a:spcPct val="100000"/>
+              </a:lnSpc>
+              <a:spcBef>
+                <a:spcPts val="0"/>
+              </a:spcBef>
+              <a:spcAft>
+                <a:spcPts val="0"/>
+              </a:spcAft>
+              <a:buClr>
+                <a:schemeClr val="dk1"/>
+              </a:buClr>
+              <a:buSzPts val="5400"/>
+              <a:buFont typeface="Lato Black"/>
+              <a:buNone/>
+              <a:defRPr sz="5400" b="0" i="0" u="none" strike="noStrike" cap="none">
+                <a:solidFill>
+                  <a:schemeClr val="dk1"/>
+                </a:solidFill>
+                <a:latin typeface="Lato Black"/>
+                <a:ea typeface="Lato Black"/>
+                <a:cs typeface="Lato Black"/>
+                <a:sym typeface="Lato Black"/>
+              </a:defRPr>
+            </a:lvl7pPr>
+            <a:lvl8pPr marR="0" lvl="7" algn="l" rtl="0">
+              <a:lnSpc>
+                <a:spcPct val="100000"/>
+              </a:lnSpc>
+              <a:spcBef>
+                <a:spcPts val="0"/>
+              </a:spcBef>
+              <a:spcAft>
+                <a:spcPts val="0"/>
+              </a:spcAft>
+              <a:buClr>
+                <a:schemeClr val="dk1"/>
+              </a:buClr>
+              <a:buSzPts val="5400"/>
+              <a:buFont typeface="Lato Black"/>
+              <a:buNone/>
+              <a:defRPr sz="5400" b="0" i="0" u="none" strike="noStrike" cap="none">
+                <a:solidFill>
+                  <a:schemeClr val="dk1"/>
+                </a:solidFill>
+                <a:latin typeface="Lato Black"/>
+                <a:ea typeface="Lato Black"/>
+                <a:cs typeface="Lato Black"/>
+                <a:sym typeface="Lato Black"/>
+              </a:defRPr>
+            </a:lvl8pPr>
+            <a:lvl9pPr marR="0" lvl="8" algn="l" rtl="0">
+              <a:lnSpc>
+                <a:spcPct val="100000"/>
+              </a:lnSpc>
+              <a:spcBef>
+                <a:spcPts val="0"/>
+              </a:spcBef>
+              <a:spcAft>
+                <a:spcPts val="0"/>
+              </a:spcAft>
+              <a:buClr>
+                <a:schemeClr val="dk1"/>
+              </a:buClr>
+              <a:buSzPts val="5400"/>
+              <a:buFont typeface="Lato Black"/>
+              <a:buNone/>
+              <a:defRPr sz="5400" b="0" i="0" u="none" strike="noStrike" cap="none">
+                <a:solidFill>
+                  <a:schemeClr val="dk1"/>
+                </a:solidFill>
+                <a:latin typeface="Lato Black"/>
+                <a:ea typeface="Lato Black"/>
+                <a:cs typeface="Lato Black"/>
+                <a:sym typeface="Lato Black"/>
+              </a:defRPr>
+            </a:lvl9pPr>
+          </a:lstStyle>
+          <a:p>
+            <a:pPr algn="ctr"/>
+            <a:r>
+              <a:rPr lang="es-MX" sz="2800" dirty="0" smtClean="0">
+                <a:effectLst>
+                  <a:outerShdw blurRad="38100" dist="38100" dir="2700000" algn="tl">
+                    <a:srgbClr val="000000">
+                      <a:alpha val="43137"/>
+                    </a:srgbClr>
+                  </a:outerShdw>
+                </a:effectLst>
+              </a:rPr>
+              <a:t>FUNCION AMBIENTE</a:t>
+            </a:r>
+            <a:endParaRPr lang="es-MX" sz="2800" dirty="0">
+              <a:effectLst>
+                <a:outerShdw blurRad="38100" dist="38100" dir="2700000" algn="tl">
+                  <a:srgbClr val="000000">
+                    <a:alpha val="43137"/>
+                  </a:srgbClr>
+                </a:outerShdw>
+              </a:effectLst>
+            </a:endParaRPr>
+          </a:p>
+        </p:txBody>
+      </p:sp>
     </p:spTree>
     <p:extLst>
       <p:ext uri="{BB962C8B-B14F-4D97-AF65-F5344CB8AC3E}">

</xml_diff>